<commit_message>
Aim, Goals, Carlos Intro corrections
</commit_message>
<xml_diff>
--- a/Thesis Figures/Structure.pptx
+++ b/Thesis Figures/Structure.pptx
@@ -8,6 +8,7 @@
     <p:sldId id="256" r:id="rId2"/>
     <p:sldId id="257" r:id="rId3"/>
     <p:sldId id="258" r:id="rId4"/>
+    <p:sldId id="259" r:id="rId5"/>
   </p:sldIdLst>
   <p:sldSz cx="9144000" cy="6858000" type="screen4x3"/>
   <p:notesSz cx="7099300" cy="10234613"/>
@@ -290,7 +291,7 @@
           <a:p>
             <a:fld id="{888D7B9B-14B0-4758-842D-9BC7AEC0FBD5}" type="datetimeFigureOut">
               <a:rPr lang="en-GB" smtClean="0"/>
-              <a:t>24/06/2015</a:t>
+              <a:t>06/08/2015</a:t>
             </a:fld>
             <a:endParaRPr lang="en-GB"/>
           </a:p>
@@ -460,7 +461,7 @@
           <a:p>
             <a:fld id="{888D7B9B-14B0-4758-842D-9BC7AEC0FBD5}" type="datetimeFigureOut">
               <a:rPr lang="en-GB" smtClean="0"/>
-              <a:t>24/06/2015</a:t>
+              <a:t>06/08/2015</a:t>
             </a:fld>
             <a:endParaRPr lang="en-GB"/>
           </a:p>
@@ -640,7 +641,7 @@
           <a:p>
             <a:fld id="{888D7B9B-14B0-4758-842D-9BC7AEC0FBD5}" type="datetimeFigureOut">
               <a:rPr lang="en-GB" smtClean="0"/>
-              <a:t>24/06/2015</a:t>
+              <a:t>06/08/2015</a:t>
             </a:fld>
             <a:endParaRPr lang="en-GB"/>
           </a:p>
@@ -810,7 +811,7 @@
           <a:p>
             <a:fld id="{888D7B9B-14B0-4758-842D-9BC7AEC0FBD5}" type="datetimeFigureOut">
               <a:rPr lang="en-GB" smtClean="0"/>
-              <a:t>24/06/2015</a:t>
+              <a:t>06/08/2015</a:t>
             </a:fld>
             <a:endParaRPr lang="en-GB"/>
           </a:p>
@@ -1056,7 +1057,7 @@
           <a:p>
             <a:fld id="{888D7B9B-14B0-4758-842D-9BC7AEC0FBD5}" type="datetimeFigureOut">
               <a:rPr lang="en-GB" smtClean="0"/>
-              <a:t>24/06/2015</a:t>
+              <a:t>06/08/2015</a:t>
             </a:fld>
             <a:endParaRPr lang="en-GB"/>
           </a:p>
@@ -1344,7 +1345,7 @@
           <a:p>
             <a:fld id="{888D7B9B-14B0-4758-842D-9BC7AEC0FBD5}" type="datetimeFigureOut">
               <a:rPr lang="en-GB" smtClean="0"/>
-              <a:t>24/06/2015</a:t>
+              <a:t>06/08/2015</a:t>
             </a:fld>
             <a:endParaRPr lang="en-GB"/>
           </a:p>
@@ -1766,7 +1767,7 @@
           <a:p>
             <a:fld id="{888D7B9B-14B0-4758-842D-9BC7AEC0FBD5}" type="datetimeFigureOut">
               <a:rPr lang="en-GB" smtClean="0"/>
-              <a:t>24/06/2015</a:t>
+              <a:t>06/08/2015</a:t>
             </a:fld>
             <a:endParaRPr lang="en-GB"/>
           </a:p>
@@ -1884,7 +1885,7 @@
           <a:p>
             <a:fld id="{888D7B9B-14B0-4758-842D-9BC7AEC0FBD5}" type="datetimeFigureOut">
               <a:rPr lang="en-GB" smtClean="0"/>
-              <a:t>24/06/2015</a:t>
+              <a:t>06/08/2015</a:t>
             </a:fld>
             <a:endParaRPr lang="en-GB"/>
           </a:p>
@@ -1979,7 +1980,7 @@
           <a:p>
             <a:fld id="{888D7B9B-14B0-4758-842D-9BC7AEC0FBD5}" type="datetimeFigureOut">
               <a:rPr lang="en-GB" smtClean="0"/>
-              <a:t>24/06/2015</a:t>
+              <a:t>06/08/2015</a:t>
             </a:fld>
             <a:endParaRPr lang="en-GB"/>
           </a:p>
@@ -2256,7 +2257,7 @@
           <a:p>
             <a:fld id="{888D7B9B-14B0-4758-842D-9BC7AEC0FBD5}" type="datetimeFigureOut">
               <a:rPr lang="en-GB" smtClean="0"/>
-              <a:t>24/06/2015</a:t>
+              <a:t>06/08/2015</a:t>
             </a:fld>
             <a:endParaRPr lang="en-GB"/>
           </a:p>
@@ -2509,7 +2510,7 @@
           <a:p>
             <a:fld id="{888D7B9B-14B0-4758-842D-9BC7AEC0FBD5}" type="datetimeFigureOut">
               <a:rPr lang="en-GB" smtClean="0"/>
-              <a:t>24/06/2015</a:t>
+              <a:t>06/08/2015</a:t>
             </a:fld>
             <a:endParaRPr lang="en-GB"/>
           </a:p>
@@ -2722,7 +2723,7 @@
           <a:p>
             <a:fld id="{888D7B9B-14B0-4758-842D-9BC7AEC0FBD5}" type="datetimeFigureOut">
               <a:rPr lang="en-GB" smtClean="0"/>
-              <a:t>24/06/2015</a:t>
+              <a:t>06/08/2015</a:t>
             </a:fld>
             <a:endParaRPr lang="en-GB"/>
           </a:p>
@@ -5978,7 +5979,7 @@
         </p:nvSpPr>
         <p:spPr>
           <a:xfrm>
-            <a:off x="1029969" y="3370560"/>
+            <a:off x="1053825" y="3370560"/>
             <a:ext cx="432048" cy="307777"/>
           </a:xfrm>
           <a:prstGeom prst="rect">
@@ -6057,7 +6058,7 @@
         </p:nvSpPr>
         <p:spPr>
           <a:xfrm>
-            <a:off x="943103" y="2961372"/>
+            <a:off x="935151" y="2944959"/>
             <a:ext cx="432048" cy="307777"/>
           </a:xfrm>
           <a:prstGeom prst="rect">
@@ -6344,6 +6345,141 @@
           <a:p>
             <a:pPr algn="ctr"/>
             <a:endParaRPr lang="en-GB"/>
+          </a:p>
+        </p:txBody>
+      </p:sp>
+      <p:sp>
+        <p:nvSpPr>
+          <p:cNvPr id="4" name="Gleichschenkliges Dreieck 3"/>
+          <p:cNvSpPr/>
+          <p:nvPr/>
+        </p:nvSpPr>
+        <p:spPr>
+          <a:xfrm>
+            <a:off x="1163653" y="3269096"/>
+            <a:ext cx="144000" cy="144000"/>
+          </a:xfrm>
+          <a:prstGeom prst="triangle">
+            <a:avLst/>
+          </a:prstGeom>
+          <a:ln>
+            <a:noFill/>
+          </a:ln>
+        </p:spPr>
+        <p:style>
+          <a:lnRef idx="2">
+            <a:schemeClr val="dk1">
+              <a:shade val="50000"/>
+            </a:schemeClr>
+          </a:lnRef>
+          <a:fillRef idx="1">
+            <a:schemeClr val="dk1"/>
+          </a:fillRef>
+          <a:effectRef idx="0">
+            <a:schemeClr val="dk1"/>
+          </a:effectRef>
+          <a:fontRef idx="minor">
+            <a:schemeClr val="lt1"/>
+          </a:fontRef>
+        </p:style>
+        <p:txBody>
+          <a:bodyPr rtlCol="0" anchor="ctr"/>
+          <a:lstStyle/>
+          <a:p>
+            <a:pPr algn="ctr"/>
+            <a:endParaRPr lang="de-DE"/>
+          </a:p>
+        </p:txBody>
+      </p:sp>
+      <p:sp>
+        <p:nvSpPr>
+          <p:cNvPr id="5" name="Ellipse 4"/>
+          <p:cNvSpPr/>
+          <p:nvPr/>
+        </p:nvSpPr>
+        <p:spPr>
+          <a:xfrm>
+            <a:off x="1199551" y="2945468"/>
+            <a:ext cx="76633" cy="144000"/>
+          </a:xfrm>
+          <a:prstGeom prst="ellipse">
+            <a:avLst/>
+          </a:prstGeom>
+          <a:solidFill>
+            <a:schemeClr val="tx1"/>
+          </a:solidFill>
+          <a:ln>
+            <a:noFill/>
+          </a:ln>
+        </p:spPr>
+        <p:style>
+          <a:lnRef idx="2">
+            <a:schemeClr val="accent1">
+              <a:shade val="50000"/>
+            </a:schemeClr>
+          </a:lnRef>
+          <a:fillRef idx="1">
+            <a:schemeClr val="accent1"/>
+          </a:fillRef>
+          <a:effectRef idx="0">
+            <a:schemeClr val="accent1"/>
+          </a:effectRef>
+          <a:fontRef idx="minor">
+            <a:schemeClr val="lt1"/>
+          </a:fontRef>
+        </p:style>
+        <p:txBody>
+          <a:bodyPr rtlCol="0" anchor="ctr"/>
+          <a:lstStyle/>
+          <a:p>
+            <a:pPr algn="ctr"/>
+            <a:endParaRPr lang="de-DE"/>
+          </a:p>
+        </p:txBody>
+      </p:sp>
+      <p:sp>
+        <p:nvSpPr>
+          <p:cNvPr id="9" name="Regelmäßiges Fünfeck 8"/>
+          <p:cNvSpPr/>
+          <p:nvPr/>
+        </p:nvSpPr>
+        <p:spPr>
+          <a:xfrm rot="20856874">
+            <a:off x="1719785" y="2955744"/>
+            <a:ext cx="144016" cy="144000"/>
+          </a:xfrm>
+          <a:prstGeom prst="pentagon">
+            <a:avLst/>
+          </a:prstGeom>
+          <a:solidFill>
+            <a:schemeClr val="tx1"/>
+          </a:solidFill>
+          <a:ln>
+            <a:noFill/>
+          </a:ln>
+        </p:spPr>
+        <p:style>
+          <a:lnRef idx="2">
+            <a:schemeClr val="accent1">
+              <a:shade val="50000"/>
+            </a:schemeClr>
+          </a:lnRef>
+          <a:fillRef idx="1">
+            <a:schemeClr val="accent1"/>
+          </a:fillRef>
+          <a:effectRef idx="0">
+            <a:schemeClr val="accent1"/>
+          </a:effectRef>
+          <a:fontRef idx="minor">
+            <a:schemeClr val="lt1"/>
+          </a:fontRef>
+        </p:style>
+        <p:txBody>
+          <a:bodyPr rtlCol="0" anchor="ctr"/>
+          <a:lstStyle/>
+          <a:p>
+            <a:pPr algn="ctr"/>
+            <a:endParaRPr lang="de-DE"/>
           </a:p>
         </p:txBody>
       </p:sp>
@@ -6531,7 +6667,7 @@
         </p:blipFill>
         <p:spPr bwMode="auto">
           <a:xfrm>
-            <a:off x="4070485" y="4646758"/>
+            <a:off x="3923928" y="4646758"/>
             <a:ext cx="2357957" cy="1728192"/>
           </a:xfrm>
           <a:prstGeom prst="rect">
@@ -6670,6 +6806,2382 @@
     <p:extLst>
       <p:ext uri="{BB962C8B-B14F-4D97-AF65-F5344CB8AC3E}">
         <p14:creationId xmlns:p14="http://schemas.microsoft.com/office/powerpoint/2010/main" val="157289360"/>
+      </p:ext>
+    </p:extLst>
+  </p:cSld>
+  <p:clrMapOvr>
+    <a:masterClrMapping/>
+  </p:clrMapOvr>
+  <p:timing>
+    <p:tnLst>
+      <p:par>
+        <p:cTn id="1" dur="indefinite" restart="never" nodeType="tmRoot"/>
+      </p:par>
+    </p:tnLst>
+  </p:timing>
+</p:sld>
+</file>
+
+<file path=ppt/slides/slide4.xml><?xml version="1.0" encoding="utf-8"?>
+<p:sld xmlns:a="http://schemas.openxmlformats.org/drawingml/2006/main" xmlns:r="http://schemas.openxmlformats.org/officeDocument/2006/relationships" xmlns:p="http://schemas.openxmlformats.org/presentationml/2006/main">
+  <p:cSld>
+    <p:spTree>
+      <p:nvGrpSpPr>
+        <p:cNvPr id="1" name=""/>
+        <p:cNvGrpSpPr/>
+        <p:nvPr/>
+      </p:nvGrpSpPr>
+      <p:grpSpPr>
+        <a:xfrm>
+          <a:off x="0" y="0"/>
+          <a:ext cx="0" cy="0"/>
+          <a:chOff x="0" y="0"/>
+          <a:chExt cx="0" cy="0"/>
+        </a:xfrm>
+      </p:grpSpPr>
+      <p:pic>
+        <p:nvPicPr>
+          <p:cNvPr id="1026" name="Picture 2" descr="C:\Users\Raphael\Desktop 4\MVMi VP2.png"/>
+          <p:cNvPicPr>
+            <a:picLocks noChangeAspect="1" noChangeArrowheads="1"/>
+          </p:cNvPicPr>
+          <p:nvPr/>
+        </p:nvPicPr>
+        <p:blipFill rotWithShape="1">
+          <a:blip r:embed="rId2">
+            <a:extLst>
+              <a:ext uri="{28A0092B-C50C-407E-A947-70E740481C1C}">
+                <a14:useLocalDpi xmlns:a14="http://schemas.microsoft.com/office/drawing/2010/main" val="0"/>
+              </a:ext>
+            </a:extLst>
+          </a:blip>
+          <a:srcRect t="2948" r="2177"/>
+          <a:stretch/>
+        </p:blipFill>
+        <p:spPr bwMode="auto">
+          <a:xfrm>
+            <a:off x="236464" y="692696"/>
+            <a:ext cx="8656016" cy="5772110"/>
+          </a:xfrm>
+          <a:prstGeom prst="rect">
+            <a:avLst/>
+          </a:prstGeom>
+          <a:noFill/>
+          <a:extLst>
+            <a:ext uri="{909E8E84-426E-40DD-AFC4-6F175D3DCCD1}">
+              <a14:hiddenFill xmlns:a14="http://schemas.microsoft.com/office/drawing/2010/main">
+                <a:solidFill>
+                  <a:srgbClr val="FFFFFF"/>
+                </a:solidFill>
+              </a14:hiddenFill>
+            </a:ext>
+          </a:extLst>
+        </p:spPr>
+      </p:pic>
+      <p:sp>
+        <p:nvSpPr>
+          <p:cNvPr id="5" name="Textfeld 4"/>
+          <p:cNvSpPr txBox="1"/>
+          <p:nvPr/>
+        </p:nvSpPr>
+        <p:spPr>
+          <a:xfrm>
+            <a:off x="4628952" y="5918518"/>
+            <a:ext cx="504056" cy="338554"/>
+          </a:xfrm>
+          <a:prstGeom prst="rect">
+            <a:avLst/>
+          </a:prstGeom>
+          <a:noFill/>
+        </p:spPr>
+        <p:txBody>
+          <a:bodyPr wrap="square" rtlCol="0">
+            <a:spAutoFit/>
+          </a:bodyPr>
+          <a:lstStyle/>
+          <a:p>
+            <a:r>
+              <a:rPr lang="el-GR" sz="1600" b="1" dirty="0" smtClean="0">
+                <a:solidFill>
+                  <a:prstClr val="white"/>
+                </a:solidFill>
+                <a:latin typeface="Arial" panose="020B0604020202020204" pitchFamily="34" charset="0"/>
+                <a:cs typeface="Arial" panose="020B0604020202020204" pitchFamily="34" charset="0"/>
+              </a:rPr>
+              <a:t>β</a:t>
+            </a:r>
+            <a:r>
+              <a:rPr lang="de-CH" sz="1600" b="1" dirty="0" smtClean="0">
+                <a:solidFill>
+                  <a:prstClr val="white"/>
+                </a:solidFill>
+                <a:latin typeface="Arial" panose="020B0604020202020204" pitchFamily="34" charset="0"/>
+                <a:cs typeface="Arial" panose="020B0604020202020204" pitchFamily="34" charset="0"/>
+              </a:rPr>
+              <a:t>A</a:t>
+            </a:r>
+            <a:endParaRPr lang="en-GB" sz="1600" b="1" dirty="0">
+              <a:solidFill>
+                <a:prstClr val="white"/>
+              </a:solidFill>
+              <a:latin typeface="Arial" panose="020B0604020202020204" pitchFamily="34" charset="0"/>
+              <a:cs typeface="Arial" panose="020B0604020202020204" pitchFamily="34" charset="0"/>
+            </a:endParaRPr>
+          </a:p>
+        </p:txBody>
+      </p:sp>
+      <p:sp>
+        <p:nvSpPr>
+          <p:cNvPr id="6" name="Textfeld 5"/>
+          <p:cNvSpPr txBox="1"/>
+          <p:nvPr/>
+        </p:nvSpPr>
+        <p:spPr>
+          <a:xfrm>
+            <a:off x="4412928" y="5567206"/>
+            <a:ext cx="504056" cy="338554"/>
+          </a:xfrm>
+          <a:prstGeom prst="rect">
+            <a:avLst/>
+          </a:prstGeom>
+          <a:noFill/>
+        </p:spPr>
+        <p:txBody>
+          <a:bodyPr wrap="square" rtlCol="0">
+            <a:spAutoFit/>
+          </a:bodyPr>
+          <a:lstStyle/>
+          <a:p>
+            <a:r>
+              <a:rPr lang="el-GR" sz="1600" b="1" dirty="0" smtClean="0">
+                <a:solidFill>
+                  <a:prstClr val="white"/>
+                </a:solidFill>
+                <a:latin typeface="Arial" panose="020B0604020202020204" pitchFamily="34" charset="0"/>
+                <a:cs typeface="Arial" panose="020B0604020202020204" pitchFamily="34" charset="0"/>
+              </a:rPr>
+              <a:t>β</a:t>
+            </a:r>
+            <a:r>
+              <a:rPr lang="de-CH" sz="1600" b="1" dirty="0">
+                <a:solidFill>
+                  <a:prstClr val="white"/>
+                </a:solidFill>
+                <a:latin typeface="Arial" panose="020B0604020202020204" pitchFamily="34" charset="0"/>
+                <a:cs typeface="Arial" panose="020B0604020202020204" pitchFamily="34" charset="0"/>
+              </a:rPr>
+              <a:t>B</a:t>
+            </a:r>
+            <a:endParaRPr lang="en-GB" sz="1600" b="1" dirty="0">
+              <a:solidFill>
+                <a:prstClr val="white"/>
+              </a:solidFill>
+              <a:latin typeface="Arial" panose="020B0604020202020204" pitchFamily="34" charset="0"/>
+              <a:cs typeface="Arial" panose="020B0604020202020204" pitchFamily="34" charset="0"/>
+            </a:endParaRPr>
+          </a:p>
+        </p:txBody>
+      </p:sp>
+      <p:sp>
+        <p:nvSpPr>
+          <p:cNvPr id="7" name="Textfeld 6"/>
+          <p:cNvSpPr txBox="1"/>
+          <p:nvPr/>
+        </p:nvSpPr>
+        <p:spPr>
+          <a:xfrm>
+            <a:off x="2612728" y="3974302"/>
+            <a:ext cx="504056" cy="338554"/>
+          </a:xfrm>
+          <a:prstGeom prst="rect">
+            <a:avLst/>
+          </a:prstGeom>
+          <a:noFill/>
+        </p:spPr>
+        <p:txBody>
+          <a:bodyPr wrap="square" rtlCol="0">
+            <a:spAutoFit/>
+          </a:bodyPr>
+          <a:lstStyle/>
+          <a:p>
+            <a:r>
+              <a:rPr lang="el-GR" sz="1600" b="1" dirty="0" smtClean="0">
+                <a:solidFill>
+                  <a:prstClr val="white"/>
+                </a:solidFill>
+                <a:latin typeface="Arial" panose="020B0604020202020204" pitchFamily="34" charset="0"/>
+                <a:cs typeface="Arial" panose="020B0604020202020204" pitchFamily="34" charset="0"/>
+              </a:rPr>
+              <a:t>β</a:t>
+            </a:r>
+            <a:r>
+              <a:rPr lang="de-CH" sz="1600" b="1" dirty="0" smtClean="0">
+                <a:solidFill>
+                  <a:prstClr val="white"/>
+                </a:solidFill>
+                <a:latin typeface="Arial" panose="020B0604020202020204" pitchFamily="34" charset="0"/>
+                <a:cs typeface="Arial" panose="020B0604020202020204" pitchFamily="34" charset="0"/>
+              </a:rPr>
+              <a:t>C</a:t>
+            </a:r>
+            <a:endParaRPr lang="en-GB" sz="1600" b="1" dirty="0">
+              <a:solidFill>
+                <a:prstClr val="white"/>
+              </a:solidFill>
+              <a:latin typeface="Arial" panose="020B0604020202020204" pitchFamily="34" charset="0"/>
+              <a:cs typeface="Arial" panose="020B0604020202020204" pitchFamily="34" charset="0"/>
+            </a:endParaRPr>
+          </a:p>
+        </p:txBody>
+      </p:sp>
+      <p:sp>
+        <p:nvSpPr>
+          <p:cNvPr id="8" name="Textfeld 7"/>
+          <p:cNvSpPr txBox="1"/>
+          <p:nvPr/>
+        </p:nvSpPr>
+        <p:spPr>
+          <a:xfrm>
+            <a:off x="2267744" y="5350634"/>
+            <a:ext cx="504056" cy="338554"/>
+          </a:xfrm>
+          <a:prstGeom prst="rect">
+            <a:avLst/>
+          </a:prstGeom>
+          <a:noFill/>
+        </p:spPr>
+        <p:txBody>
+          <a:bodyPr wrap="square" rtlCol="0">
+            <a:spAutoFit/>
+          </a:bodyPr>
+          <a:lstStyle/>
+          <a:p>
+            <a:r>
+              <a:rPr lang="el-GR" sz="1600" b="1" dirty="0" smtClean="0">
+                <a:solidFill>
+                  <a:prstClr val="white"/>
+                </a:solidFill>
+                <a:latin typeface="Arial" panose="020B0604020202020204" pitchFamily="34" charset="0"/>
+                <a:cs typeface="Arial" panose="020B0604020202020204" pitchFamily="34" charset="0"/>
+              </a:rPr>
+              <a:t>β</a:t>
+            </a:r>
+            <a:r>
+              <a:rPr lang="de-CH" sz="1600" b="1" dirty="0" smtClean="0">
+                <a:solidFill>
+                  <a:prstClr val="white"/>
+                </a:solidFill>
+                <a:latin typeface="Arial" panose="020B0604020202020204" pitchFamily="34" charset="0"/>
+                <a:cs typeface="Arial" panose="020B0604020202020204" pitchFamily="34" charset="0"/>
+              </a:rPr>
+              <a:t>D</a:t>
+            </a:r>
+            <a:endParaRPr lang="en-GB" sz="1600" b="1" dirty="0">
+              <a:solidFill>
+                <a:prstClr val="white"/>
+              </a:solidFill>
+              <a:latin typeface="Arial" panose="020B0604020202020204" pitchFamily="34" charset="0"/>
+              <a:cs typeface="Arial" panose="020B0604020202020204" pitchFamily="34" charset="0"/>
+            </a:endParaRPr>
+          </a:p>
+        </p:txBody>
+      </p:sp>
+      <p:sp>
+        <p:nvSpPr>
+          <p:cNvPr id="10" name="Textfeld 9"/>
+          <p:cNvSpPr txBox="1"/>
+          <p:nvPr/>
+        </p:nvSpPr>
+        <p:spPr>
+          <a:xfrm>
+            <a:off x="2601711" y="4952185"/>
+            <a:ext cx="504056" cy="338554"/>
+          </a:xfrm>
+          <a:prstGeom prst="rect">
+            <a:avLst/>
+          </a:prstGeom>
+          <a:noFill/>
+        </p:spPr>
+        <p:txBody>
+          <a:bodyPr wrap="square" rtlCol="0">
+            <a:spAutoFit/>
+          </a:bodyPr>
+          <a:lstStyle/>
+          <a:p>
+            <a:r>
+              <a:rPr lang="el-GR" sz="1600" b="1" dirty="0" smtClean="0">
+                <a:solidFill>
+                  <a:prstClr val="white"/>
+                </a:solidFill>
+                <a:latin typeface="Arial" panose="020B0604020202020204" pitchFamily="34" charset="0"/>
+                <a:cs typeface="Arial" panose="020B0604020202020204" pitchFamily="34" charset="0"/>
+              </a:rPr>
+              <a:t>β</a:t>
+            </a:r>
+            <a:r>
+              <a:rPr lang="de-CH" sz="1600" b="1" dirty="0" smtClean="0">
+                <a:solidFill>
+                  <a:prstClr val="white"/>
+                </a:solidFill>
+                <a:latin typeface="Arial" panose="020B0604020202020204" pitchFamily="34" charset="0"/>
+                <a:cs typeface="Arial" panose="020B0604020202020204" pitchFamily="34" charset="0"/>
+              </a:rPr>
+              <a:t>F</a:t>
+            </a:r>
+            <a:endParaRPr lang="en-GB" sz="1600" b="1" dirty="0">
+              <a:solidFill>
+                <a:prstClr val="white"/>
+              </a:solidFill>
+              <a:latin typeface="Arial" panose="020B0604020202020204" pitchFamily="34" charset="0"/>
+              <a:cs typeface="Arial" panose="020B0604020202020204" pitchFamily="34" charset="0"/>
+            </a:endParaRPr>
+          </a:p>
+        </p:txBody>
+      </p:sp>
+      <p:sp>
+        <p:nvSpPr>
+          <p:cNvPr id="11" name="Textfeld 10"/>
+          <p:cNvSpPr txBox="1"/>
+          <p:nvPr/>
+        </p:nvSpPr>
+        <p:spPr>
+          <a:xfrm>
+            <a:off x="2623745" y="4456235"/>
+            <a:ext cx="504056" cy="338554"/>
+          </a:xfrm>
+          <a:prstGeom prst="rect">
+            <a:avLst/>
+          </a:prstGeom>
+          <a:noFill/>
+        </p:spPr>
+        <p:txBody>
+          <a:bodyPr wrap="square" rtlCol="0">
+            <a:spAutoFit/>
+          </a:bodyPr>
+          <a:lstStyle/>
+          <a:p>
+            <a:r>
+              <a:rPr lang="el-GR" sz="1600" b="1" dirty="0" smtClean="0">
+                <a:solidFill>
+                  <a:prstClr val="white"/>
+                </a:solidFill>
+                <a:latin typeface="Arial" panose="020B0604020202020204" pitchFamily="34" charset="0"/>
+                <a:cs typeface="Arial" panose="020B0604020202020204" pitchFamily="34" charset="0"/>
+              </a:rPr>
+              <a:t>β</a:t>
+            </a:r>
+            <a:r>
+              <a:rPr lang="de-CH" sz="1600" b="1" dirty="0">
+                <a:solidFill>
+                  <a:prstClr val="white"/>
+                </a:solidFill>
+                <a:latin typeface="Arial" panose="020B0604020202020204" pitchFamily="34" charset="0"/>
+                <a:cs typeface="Arial" panose="020B0604020202020204" pitchFamily="34" charset="0"/>
+              </a:rPr>
+              <a:t>H</a:t>
+            </a:r>
+            <a:endParaRPr lang="en-GB" sz="1600" b="1" dirty="0">
+              <a:solidFill>
+                <a:prstClr val="white"/>
+              </a:solidFill>
+              <a:latin typeface="Arial" panose="020B0604020202020204" pitchFamily="34" charset="0"/>
+              <a:cs typeface="Arial" panose="020B0604020202020204" pitchFamily="34" charset="0"/>
+            </a:endParaRPr>
+          </a:p>
+        </p:txBody>
+      </p:sp>
+      <p:sp>
+        <p:nvSpPr>
+          <p:cNvPr id="12" name="Textfeld 11"/>
+          <p:cNvSpPr txBox="1"/>
+          <p:nvPr/>
+        </p:nvSpPr>
+        <p:spPr>
+          <a:xfrm>
+            <a:off x="2828752" y="5589240"/>
+            <a:ext cx="504056" cy="338554"/>
+          </a:xfrm>
+          <a:prstGeom prst="rect">
+            <a:avLst/>
+          </a:prstGeom>
+          <a:noFill/>
+        </p:spPr>
+        <p:txBody>
+          <a:bodyPr wrap="square" rtlCol="0">
+            <a:spAutoFit/>
+          </a:bodyPr>
+          <a:lstStyle/>
+          <a:p>
+            <a:r>
+              <a:rPr lang="el-GR" sz="1600" b="1" dirty="0" smtClean="0">
+                <a:solidFill>
+                  <a:prstClr val="white"/>
+                </a:solidFill>
+                <a:latin typeface="Arial" panose="020B0604020202020204" pitchFamily="34" charset="0"/>
+                <a:cs typeface="Arial" panose="020B0604020202020204" pitchFamily="34" charset="0"/>
+              </a:rPr>
+              <a:t>β</a:t>
+            </a:r>
+            <a:r>
+              <a:rPr lang="de-CH" sz="1600" b="1" dirty="0">
+                <a:solidFill>
+                  <a:prstClr val="white"/>
+                </a:solidFill>
+                <a:latin typeface="Arial" panose="020B0604020202020204" pitchFamily="34" charset="0"/>
+                <a:cs typeface="Arial" panose="020B0604020202020204" pitchFamily="34" charset="0"/>
+              </a:rPr>
+              <a:t>G</a:t>
+            </a:r>
+            <a:endParaRPr lang="en-GB" sz="1600" b="1" dirty="0">
+              <a:solidFill>
+                <a:prstClr val="white"/>
+              </a:solidFill>
+              <a:latin typeface="Arial" panose="020B0604020202020204" pitchFamily="34" charset="0"/>
+              <a:cs typeface="Arial" panose="020B0604020202020204" pitchFamily="34" charset="0"/>
+            </a:endParaRPr>
+          </a:p>
+        </p:txBody>
+      </p:sp>
+      <p:sp>
+        <p:nvSpPr>
+          <p:cNvPr id="13" name="Textfeld 12"/>
+          <p:cNvSpPr txBox="1"/>
+          <p:nvPr/>
+        </p:nvSpPr>
+        <p:spPr>
+          <a:xfrm>
+            <a:off x="2255869" y="4938904"/>
+            <a:ext cx="504056" cy="338554"/>
+          </a:xfrm>
+          <a:prstGeom prst="rect">
+            <a:avLst/>
+          </a:prstGeom>
+          <a:noFill/>
+        </p:spPr>
+        <p:txBody>
+          <a:bodyPr wrap="square" rtlCol="0">
+            <a:spAutoFit/>
+          </a:bodyPr>
+          <a:lstStyle/>
+          <a:p>
+            <a:r>
+              <a:rPr lang="el-GR" sz="1600" b="1" dirty="0" smtClean="0">
+                <a:solidFill>
+                  <a:prstClr val="white"/>
+                </a:solidFill>
+                <a:latin typeface="Arial" panose="020B0604020202020204" pitchFamily="34" charset="0"/>
+                <a:cs typeface="Arial" panose="020B0604020202020204" pitchFamily="34" charset="0"/>
+              </a:rPr>
+              <a:t>β</a:t>
+            </a:r>
+            <a:r>
+              <a:rPr lang="de-CH" sz="1600" b="1" dirty="0" smtClean="0">
+                <a:solidFill>
+                  <a:prstClr val="white"/>
+                </a:solidFill>
+                <a:latin typeface="Arial" panose="020B0604020202020204" pitchFamily="34" charset="0"/>
+                <a:cs typeface="Arial" panose="020B0604020202020204" pitchFamily="34" charset="0"/>
+              </a:rPr>
+              <a:t>I</a:t>
+            </a:r>
+            <a:endParaRPr lang="en-GB" sz="1600" b="1" dirty="0">
+              <a:solidFill>
+                <a:prstClr val="white"/>
+              </a:solidFill>
+              <a:latin typeface="Arial" panose="020B0604020202020204" pitchFamily="34" charset="0"/>
+              <a:cs typeface="Arial" panose="020B0604020202020204" pitchFamily="34" charset="0"/>
+            </a:endParaRPr>
+          </a:p>
+        </p:txBody>
+      </p:sp>
+      <p:sp>
+        <p:nvSpPr>
+          <p:cNvPr id="15" name="Textfeld 14"/>
+          <p:cNvSpPr txBox="1"/>
+          <p:nvPr/>
+        </p:nvSpPr>
+        <p:spPr>
+          <a:xfrm>
+            <a:off x="2695753" y="4625196"/>
+            <a:ext cx="504056" cy="338554"/>
+          </a:xfrm>
+          <a:prstGeom prst="rect">
+            <a:avLst/>
+          </a:prstGeom>
+          <a:noFill/>
+        </p:spPr>
+        <p:txBody>
+          <a:bodyPr wrap="square" rtlCol="0">
+            <a:spAutoFit/>
+          </a:bodyPr>
+          <a:lstStyle/>
+          <a:p>
+            <a:r>
+              <a:rPr lang="el-GR" sz="1600" b="1" dirty="0" smtClean="0">
+                <a:solidFill>
+                  <a:prstClr val="white"/>
+                </a:solidFill>
+                <a:latin typeface="Arial" panose="020B0604020202020204" pitchFamily="34" charset="0"/>
+                <a:cs typeface="Arial" panose="020B0604020202020204" pitchFamily="34" charset="0"/>
+              </a:rPr>
+              <a:t>β</a:t>
+            </a:r>
+            <a:r>
+              <a:rPr lang="de-CH" sz="1600" b="1" dirty="0" smtClean="0">
+                <a:solidFill>
+                  <a:prstClr val="white"/>
+                </a:solidFill>
+                <a:latin typeface="Arial" panose="020B0604020202020204" pitchFamily="34" charset="0"/>
+                <a:cs typeface="Arial" panose="020B0604020202020204" pitchFamily="34" charset="0"/>
+              </a:rPr>
+              <a:t>E</a:t>
+            </a:r>
+            <a:endParaRPr lang="en-GB" sz="1600" b="1" dirty="0">
+              <a:solidFill>
+                <a:prstClr val="white"/>
+              </a:solidFill>
+              <a:latin typeface="Arial" panose="020B0604020202020204" pitchFamily="34" charset="0"/>
+              <a:cs typeface="Arial" panose="020B0604020202020204" pitchFamily="34" charset="0"/>
+            </a:endParaRPr>
+          </a:p>
+        </p:txBody>
+      </p:sp>
+      <p:sp>
+        <p:nvSpPr>
+          <p:cNvPr id="16" name="Textfeld 15"/>
+          <p:cNvSpPr txBox="1"/>
+          <p:nvPr/>
+        </p:nvSpPr>
+        <p:spPr>
+          <a:xfrm>
+            <a:off x="1012424" y="6038435"/>
+            <a:ext cx="1368152" cy="338554"/>
+          </a:xfrm>
+          <a:prstGeom prst="rect">
+            <a:avLst/>
+          </a:prstGeom>
+          <a:noFill/>
+        </p:spPr>
+        <p:txBody>
+          <a:bodyPr wrap="square" rtlCol="0">
+            <a:spAutoFit/>
+          </a:bodyPr>
+          <a:lstStyle/>
+          <a:p>
+            <a:r>
+              <a:rPr lang="de-CH" sz="1600" b="1" dirty="0" smtClean="0">
+                <a:solidFill>
+                  <a:srgbClr val="FF0101"/>
+                </a:solidFill>
+                <a:latin typeface="Arial" panose="020B0604020202020204" pitchFamily="34" charset="0"/>
+                <a:cs typeface="Arial" panose="020B0604020202020204" pitchFamily="34" charset="0"/>
+              </a:rPr>
+              <a:t>H</a:t>
+            </a:r>
+            <a:r>
+              <a:rPr lang="de-CH" sz="1600" b="1" baseline="-25000" dirty="0" smtClean="0">
+                <a:solidFill>
+                  <a:srgbClr val="FF0101"/>
+                </a:solidFill>
+                <a:latin typeface="Arial" panose="020B0604020202020204" pitchFamily="34" charset="0"/>
+                <a:cs typeface="Arial" panose="020B0604020202020204" pitchFamily="34" charset="0"/>
+              </a:rPr>
+              <a:t>2</a:t>
+            </a:r>
+            <a:r>
+              <a:rPr lang="de-CH" sz="1600" b="1" dirty="0" smtClean="0">
+                <a:solidFill>
+                  <a:srgbClr val="FF0101"/>
+                </a:solidFill>
+                <a:latin typeface="Arial" panose="020B0604020202020204" pitchFamily="34" charset="0"/>
+                <a:cs typeface="Arial" panose="020B0604020202020204" pitchFamily="34" charset="0"/>
+              </a:rPr>
+              <a:t>N - (39)</a:t>
+            </a:r>
+            <a:endParaRPr lang="en-GB" sz="1600" b="1" dirty="0">
+              <a:solidFill>
+                <a:srgbClr val="FF0101"/>
+              </a:solidFill>
+              <a:latin typeface="Arial" panose="020B0604020202020204" pitchFamily="34" charset="0"/>
+              <a:cs typeface="Arial" panose="020B0604020202020204" pitchFamily="34" charset="0"/>
+            </a:endParaRPr>
+          </a:p>
+        </p:txBody>
+      </p:sp>
+      <p:sp>
+        <p:nvSpPr>
+          <p:cNvPr id="17" name="Textfeld 16"/>
+          <p:cNvSpPr txBox="1"/>
+          <p:nvPr/>
+        </p:nvSpPr>
+        <p:spPr>
+          <a:xfrm>
+            <a:off x="6717597" y="4213499"/>
+            <a:ext cx="1512168" cy="338554"/>
+          </a:xfrm>
+          <a:prstGeom prst="rect">
+            <a:avLst/>
+          </a:prstGeom>
+          <a:noFill/>
+        </p:spPr>
+        <p:txBody>
+          <a:bodyPr wrap="square" rtlCol="0">
+            <a:spAutoFit/>
+          </a:bodyPr>
+          <a:lstStyle/>
+          <a:p>
+            <a:r>
+              <a:rPr lang="de-CH" sz="1600" b="1" dirty="0" smtClean="0">
+                <a:solidFill>
+                  <a:srgbClr val="0033CC"/>
+                </a:solidFill>
+                <a:latin typeface="Arial" panose="020B0604020202020204" pitchFamily="34" charset="0"/>
+                <a:cs typeface="Arial" panose="020B0604020202020204" pitchFamily="34" charset="0"/>
+              </a:rPr>
+              <a:t>(587) - COOH</a:t>
+            </a:r>
+            <a:endParaRPr lang="en-GB" sz="1600" b="1" dirty="0">
+              <a:solidFill>
+                <a:srgbClr val="0033CC"/>
+              </a:solidFill>
+              <a:latin typeface="Arial" panose="020B0604020202020204" pitchFamily="34" charset="0"/>
+              <a:cs typeface="Arial" panose="020B0604020202020204" pitchFamily="34" charset="0"/>
+            </a:endParaRPr>
+          </a:p>
+        </p:txBody>
+      </p:sp>
+      <p:sp>
+        <p:nvSpPr>
+          <p:cNvPr id="2" name="Regelmäßiges Fünfeck 1"/>
+          <p:cNvSpPr/>
+          <p:nvPr/>
+        </p:nvSpPr>
+        <p:spPr>
+          <a:xfrm>
+            <a:off x="1022615" y="5671026"/>
+            <a:ext cx="432000" cy="432000"/>
+          </a:xfrm>
+          <a:prstGeom prst="pentagon">
+            <a:avLst/>
+          </a:prstGeom>
+          <a:ln>
+            <a:noFill/>
+          </a:ln>
+          <a:scene3d>
+            <a:camera prst="orthographicFront">
+              <a:rot lat="3600000" lon="0" rev="0"/>
+            </a:camera>
+            <a:lightRig rig="threePt" dir="t"/>
+          </a:scene3d>
+        </p:spPr>
+        <p:style>
+          <a:lnRef idx="2">
+            <a:schemeClr val="accent1">
+              <a:shade val="50000"/>
+            </a:schemeClr>
+          </a:lnRef>
+          <a:fillRef idx="1003">
+            <a:schemeClr val="lt2"/>
+          </a:fillRef>
+          <a:effectRef idx="0">
+            <a:schemeClr val="accent1"/>
+          </a:effectRef>
+          <a:fontRef idx="minor">
+            <a:schemeClr val="lt1"/>
+          </a:fontRef>
+        </p:style>
+        <p:txBody>
+          <a:bodyPr rtlCol="0" anchor="ctr"/>
+          <a:lstStyle/>
+          <a:p>
+            <a:pPr algn="ctr"/>
+            <a:endParaRPr lang="en-GB">
+              <a:solidFill>
+                <a:prstClr val="white"/>
+              </a:solidFill>
+              <a:latin typeface="Arial" panose="020B0604020202020204" pitchFamily="34" charset="0"/>
+              <a:cs typeface="Arial" panose="020B0604020202020204" pitchFamily="34" charset="0"/>
+            </a:endParaRPr>
+          </a:p>
+        </p:txBody>
+      </p:sp>
+      <p:sp>
+        <p:nvSpPr>
+          <p:cNvPr id="3" name="Gleichschenkliges Dreieck 2"/>
+          <p:cNvSpPr/>
+          <p:nvPr/>
+        </p:nvSpPr>
+        <p:spPr>
+          <a:xfrm>
+            <a:off x="3775873" y="6008619"/>
+            <a:ext cx="396000" cy="492626"/>
+          </a:xfrm>
+          <a:prstGeom prst="triangle">
+            <a:avLst/>
+          </a:prstGeom>
+          <a:ln>
+            <a:noFill/>
+          </a:ln>
+          <a:scene3d>
+            <a:camera prst="orthographicFront">
+              <a:rot lat="3600000" lon="0" rev="0"/>
+            </a:camera>
+            <a:lightRig rig="threePt" dir="t"/>
+          </a:scene3d>
+        </p:spPr>
+        <p:style>
+          <a:lnRef idx="2">
+            <a:schemeClr val="accent1">
+              <a:shade val="50000"/>
+            </a:schemeClr>
+          </a:lnRef>
+          <a:fillRef idx="1003">
+            <a:schemeClr val="lt2"/>
+          </a:fillRef>
+          <a:effectRef idx="0">
+            <a:schemeClr val="accent1"/>
+          </a:effectRef>
+          <a:fontRef idx="minor">
+            <a:schemeClr val="lt1"/>
+          </a:fontRef>
+        </p:style>
+        <p:txBody>
+          <a:bodyPr rtlCol="0" anchor="ctr"/>
+          <a:lstStyle/>
+          <a:p>
+            <a:pPr algn="ctr"/>
+            <a:endParaRPr lang="en-GB">
+              <a:solidFill>
+                <a:prstClr val="white"/>
+              </a:solidFill>
+              <a:latin typeface="Arial" panose="020B0604020202020204" pitchFamily="34" charset="0"/>
+              <a:cs typeface="Arial" panose="020B0604020202020204" pitchFamily="34" charset="0"/>
+            </a:endParaRPr>
+          </a:p>
+        </p:txBody>
+      </p:sp>
+      <p:sp>
+        <p:nvSpPr>
+          <p:cNvPr id="4" name="Ellipse 3"/>
+          <p:cNvSpPr/>
+          <p:nvPr/>
+        </p:nvSpPr>
+        <p:spPr>
+          <a:xfrm>
+            <a:off x="5685171" y="5649374"/>
+            <a:ext cx="469766" cy="360040"/>
+          </a:xfrm>
+          <a:prstGeom prst="ellipse">
+            <a:avLst/>
+          </a:prstGeom>
+          <a:ln>
+            <a:noFill/>
+          </a:ln>
+          <a:scene3d>
+            <a:camera prst="orthographicFront">
+              <a:rot lat="3600000" lon="0" rev="0"/>
+            </a:camera>
+            <a:lightRig rig="threePt" dir="t"/>
+          </a:scene3d>
+        </p:spPr>
+        <p:style>
+          <a:lnRef idx="2">
+            <a:schemeClr val="accent1">
+              <a:shade val="50000"/>
+            </a:schemeClr>
+          </a:lnRef>
+          <a:fillRef idx="1003">
+            <a:schemeClr val="lt2"/>
+          </a:fillRef>
+          <a:effectRef idx="0">
+            <a:schemeClr val="accent1"/>
+          </a:effectRef>
+          <a:fontRef idx="minor">
+            <a:schemeClr val="lt1"/>
+          </a:fontRef>
+        </p:style>
+        <p:txBody>
+          <a:bodyPr rtlCol="0" anchor="ctr"/>
+          <a:lstStyle/>
+          <a:p>
+            <a:pPr algn="ctr"/>
+            <a:endParaRPr lang="en-GB">
+              <a:solidFill>
+                <a:prstClr val="white"/>
+              </a:solidFill>
+              <a:latin typeface="Arial" panose="020B0604020202020204" pitchFamily="34" charset="0"/>
+              <a:cs typeface="Arial" panose="020B0604020202020204" pitchFamily="34" charset="0"/>
+            </a:endParaRPr>
+          </a:p>
+        </p:txBody>
+      </p:sp>
+      <p:sp>
+        <p:nvSpPr>
+          <p:cNvPr id="18" name="Textfeld 17"/>
+          <p:cNvSpPr txBox="1"/>
+          <p:nvPr/>
+        </p:nvSpPr>
+        <p:spPr>
+          <a:xfrm>
+            <a:off x="1106053" y="5762466"/>
+            <a:ext cx="288032" cy="276999"/>
+          </a:xfrm>
+          <a:prstGeom prst="rect">
+            <a:avLst/>
+          </a:prstGeom>
+          <a:noFill/>
+          <a:scene3d>
+            <a:camera prst="orthographicFront">
+              <a:rot lat="0" lon="0" rev="0"/>
+            </a:camera>
+            <a:lightRig rig="threePt" dir="t"/>
+          </a:scene3d>
+        </p:spPr>
+        <p:txBody>
+          <a:bodyPr wrap="square" rtlCol="0">
+            <a:spAutoFit/>
+          </a:bodyPr>
+          <a:lstStyle/>
+          <a:p>
+            <a:r>
+              <a:rPr lang="de-CH" sz="1200" b="1" dirty="0" smtClean="0">
+                <a:solidFill>
+                  <a:prstClr val="black"/>
+                </a:solidFill>
+                <a:latin typeface="Arial" panose="020B0604020202020204" pitchFamily="34" charset="0"/>
+                <a:cs typeface="Arial" panose="020B0604020202020204" pitchFamily="34" charset="0"/>
+              </a:rPr>
+              <a:t>5</a:t>
+            </a:r>
+            <a:endParaRPr lang="en-GB" sz="1200" b="1" dirty="0">
+              <a:solidFill>
+                <a:prstClr val="black"/>
+              </a:solidFill>
+              <a:latin typeface="Arial" panose="020B0604020202020204" pitchFamily="34" charset="0"/>
+              <a:cs typeface="Arial" panose="020B0604020202020204" pitchFamily="34" charset="0"/>
+            </a:endParaRPr>
+          </a:p>
+        </p:txBody>
+      </p:sp>
+      <p:sp>
+        <p:nvSpPr>
+          <p:cNvPr id="20" name="Textfeld 19"/>
+          <p:cNvSpPr txBox="1"/>
+          <p:nvPr/>
+        </p:nvSpPr>
+        <p:spPr>
+          <a:xfrm>
+            <a:off x="3823263" y="6155750"/>
+            <a:ext cx="288032" cy="276999"/>
+          </a:xfrm>
+          <a:prstGeom prst="rect">
+            <a:avLst/>
+          </a:prstGeom>
+          <a:noFill/>
+        </p:spPr>
+        <p:txBody>
+          <a:bodyPr wrap="square" rtlCol="0">
+            <a:spAutoFit/>
+          </a:bodyPr>
+          <a:lstStyle/>
+          <a:p>
+            <a:r>
+              <a:rPr lang="de-CH" sz="1200" b="1" dirty="0">
+                <a:solidFill>
+                  <a:prstClr val="black"/>
+                </a:solidFill>
+                <a:latin typeface="Arial" panose="020B0604020202020204" pitchFamily="34" charset="0"/>
+                <a:cs typeface="Arial" panose="020B0604020202020204" pitchFamily="34" charset="0"/>
+              </a:rPr>
+              <a:t>3</a:t>
+            </a:r>
+            <a:endParaRPr lang="en-GB" sz="1200" b="1" dirty="0">
+              <a:solidFill>
+                <a:prstClr val="black"/>
+              </a:solidFill>
+              <a:latin typeface="Arial" panose="020B0604020202020204" pitchFamily="34" charset="0"/>
+              <a:cs typeface="Arial" panose="020B0604020202020204" pitchFamily="34" charset="0"/>
+            </a:endParaRPr>
+          </a:p>
+        </p:txBody>
+      </p:sp>
+      <p:sp>
+        <p:nvSpPr>
+          <p:cNvPr id="21" name="Textfeld 20"/>
+          <p:cNvSpPr txBox="1"/>
+          <p:nvPr/>
+        </p:nvSpPr>
+        <p:spPr>
+          <a:xfrm>
+            <a:off x="5791469" y="5695094"/>
+            <a:ext cx="288032" cy="276999"/>
+          </a:xfrm>
+          <a:prstGeom prst="rect">
+            <a:avLst/>
+          </a:prstGeom>
+          <a:noFill/>
+        </p:spPr>
+        <p:txBody>
+          <a:bodyPr wrap="square" rtlCol="0">
+            <a:spAutoFit/>
+          </a:bodyPr>
+          <a:lstStyle/>
+          <a:p>
+            <a:r>
+              <a:rPr lang="de-CH" sz="1200" b="1" dirty="0" smtClean="0">
+                <a:solidFill>
+                  <a:prstClr val="black"/>
+                </a:solidFill>
+                <a:latin typeface="Arial" panose="020B0604020202020204" pitchFamily="34" charset="0"/>
+                <a:cs typeface="Arial" panose="020B0604020202020204" pitchFamily="34" charset="0"/>
+              </a:rPr>
+              <a:t>2</a:t>
+            </a:r>
+            <a:endParaRPr lang="en-GB" sz="1200" b="1" dirty="0">
+              <a:solidFill>
+                <a:prstClr val="black"/>
+              </a:solidFill>
+              <a:latin typeface="Arial" panose="020B0604020202020204" pitchFamily="34" charset="0"/>
+              <a:cs typeface="Arial" panose="020B0604020202020204" pitchFamily="34" charset="0"/>
+            </a:endParaRPr>
+          </a:p>
+        </p:txBody>
+      </p:sp>
+      <p:sp>
+        <p:nvSpPr>
+          <p:cNvPr id="9" name="Textfeld 8"/>
+          <p:cNvSpPr txBox="1"/>
+          <p:nvPr/>
+        </p:nvSpPr>
+        <p:spPr>
+          <a:xfrm>
+            <a:off x="225447" y="3356992"/>
+            <a:ext cx="1296144" cy="338554"/>
+          </a:xfrm>
+          <a:prstGeom prst="rect">
+            <a:avLst/>
+          </a:prstGeom>
+          <a:noFill/>
+        </p:spPr>
+        <p:txBody>
+          <a:bodyPr wrap="square" rtlCol="0">
+            <a:spAutoFit/>
+          </a:bodyPr>
+          <a:lstStyle/>
+          <a:p>
+            <a:r>
+              <a:rPr lang="de-CH" sz="1600" b="1" i="1" dirty="0" smtClean="0">
+                <a:solidFill>
+                  <a:srgbClr val="FFFF00"/>
+                </a:solidFill>
+                <a:latin typeface="Arial" panose="020B0604020202020204" pitchFamily="34" charset="0"/>
+                <a:cs typeface="Arial" panose="020B0604020202020204" pitchFamily="34" charset="0"/>
+              </a:rPr>
+              <a:t>HI Loop</a:t>
+            </a:r>
+            <a:endParaRPr lang="en-GB" sz="1600" b="1" i="1" dirty="0">
+              <a:solidFill>
+                <a:srgbClr val="FFFF00"/>
+              </a:solidFill>
+              <a:latin typeface="Arial" panose="020B0604020202020204" pitchFamily="34" charset="0"/>
+              <a:cs typeface="Arial" panose="020B0604020202020204" pitchFamily="34" charset="0"/>
+            </a:endParaRPr>
+          </a:p>
+        </p:txBody>
+      </p:sp>
+      <p:sp>
+        <p:nvSpPr>
+          <p:cNvPr id="22" name="Textfeld 21"/>
+          <p:cNvSpPr txBox="1"/>
+          <p:nvPr/>
+        </p:nvSpPr>
+        <p:spPr>
+          <a:xfrm>
+            <a:off x="201697" y="4991900"/>
+            <a:ext cx="1296144" cy="338554"/>
+          </a:xfrm>
+          <a:prstGeom prst="rect">
+            <a:avLst/>
+          </a:prstGeom>
+          <a:noFill/>
+        </p:spPr>
+        <p:txBody>
+          <a:bodyPr wrap="square" rtlCol="0">
+            <a:spAutoFit/>
+          </a:bodyPr>
+          <a:lstStyle/>
+          <a:p>
+            <a:r>
+              <a:rPr lang="de-CH" sz="1600" b="1" i="1" dirty="0" smtClean="0">
+                <a:solidFill>
+                  <a:srgbClr val="FFFF00"/>
+                </a:solidFill>
+                <a:latin typeface="Arial" panose="020B0604020202020204" pitchFamily="34" charset="0"/>
+                <a:cs typeface="Arial" panose="020B0604020202020204" pitchFamily="34" charset="0"/>
+              </a:rPr>
+              <a:t>DE Loop</a:t>
+            </a:r>
+            <a:endParaRPr lang="en-GB" sz="1600" b="1" i="1" dirty="0">
+              <a:solidFill>
+                <a:srgbClr val="FFFF00"/>
+              </a:solidFill>
+              <a:latin typeface="Arial" panose="020B0604020202020204" pitchFamily="34" charset="0"/>
+              <a:cs typeface="Arial" panose="020B0604020202020204" pitchFamily="34" charset="0"/>
+            </a:endParaRPr>
+          </a:p>
+        </p:txBody>
+      </p:sp>
+      <p:sp>
+        <p:nvSpPr>
+          <p:cNvPr id="23" name="Textfeld 22"/>
+          <p:cNvSpPr txBox="1"/>
+          <p:nvPr/>
+        </p:nvSpPr>
+        <p:spPr>
+          <a:xfrm>
+            <a:off x="5680060" y="5183003"/>
+            <a:ext cx="504056" cy="338554"/>
+          </a:xfrm>
+          <a:prstGeom prst="rect">
+            <a:avLst/>
+          </a:prstGeom>
+          <a:noFill/>
+        </p:spPr>
+        <p:txBody>
+          <a:bodyPr wrap="square" rtlCol="0">
+            <a:spAutoFit/>
+          </a:bodyPr>
+          <a:lstStyle/>
+          <a:p>
+            <a:r>
+              <a:rPr lang="el-GR" sz="1600" b="1" dirty="0" smtClean="0">
+                <a:solidFill>
+                  <a:prstClr val="white"/>
+                </a:solidFill>
+                <a:latin typeface="Arial" panose="020B0604020202020204" pitchFamily="34" charset="0"/>
+                <a:cs typeface="Arial" panose="020B0604020202020204" pitchFamily="34" charset="0"/>
+              </a:rPr>
+              <a:t>α</a:t>
+            </a:r>
+            <a:r>
+              <a:rPr lang="de-CH" sz="1600" b="1" dirty="0" smtClean="0">
+                <a:solidFill>
+                  <a:prstClr val="white"/>
+                </a:solidFill>
+                <a:latin typeface="Arial" panose="020B0604020202020204" pitchFamily="34" charset="0"/>
+                <a:cs typeface="Arial" panose="020B0604020202020204" pitchFamily="34" charset="0"/>
+              </a:rPr>
+              <a:t>A</a:t>
+            </a:r>
+            <a:endParaRPr lang="en-GB" sz="1600" b="1" dirty="0">
+              <a:solidFill>
+                <a:prstClr val="white"/>
+              </a:solidFill>
+              <a:latin typeface="Arial" panose="020B0604020202020204" pitchFamily="34" charset="0"/>
+              <a:cs typeface="Arial" panose="020B0604020202020204" pitchFamily="34" charset="0"/>
+            </a:endParaRPr>
+          </a:p>
+        </p:txBody>
+      </p:sp>
+      <p:cxnSp>
+        <p:nvCxnSpPr>
+          <p:cNvPr id="24" name="Gerade Verbindung 23"/>
+          <p:cNvCxnSpPr/>
+          <p:nvPr/>
+        </p:nvCxnSpPr>
+        <p:spPr>
+          <a:xfrm>
+            <a:off x="467544" y="3861048"/>
+            <a:ext cx="741408" cy="1871992"/>
+          </a:xfrm>
+          <a:prstGeom prst="line">
+            <a:avLst/>
+          </a:prstGeom>
+          <a:ln w="19050">
+            <a:solidFill>
+              <a:schemeClr val="bg1"/>
+            </a:solidFill>
+            <a:prstDash val="lgDashDot"/>
+          </a:ln>
+        </p:spPr>
+        <p:style>
+          <a:lnRef idx="3">
+            <a:schemeClr val="dk1"/>
+          </a:lnRef>
+          <a:fillRef idx="0">
+            <a:schemeClr val="dk1"/>
+          </a:fillRef>
+          <a:effectRef idx="2">
+            <a:schemeClr val="dk1"/>
+          </a:effectRef>
+          <a:fontRef idx="minor">
+            <a:schemeClr val="tx1"/>
+          </a:fontRef>
+        </p:style>
+      </p:cxnSp>
+      <p:cxnSp>
+        <p:nvCxnSpPr>
+          <p:cNvPr id="29" name="Gerade Verbindung 28"/>
+          <p:cNvCxnSpPr/>
+          <p:nvPr/>
+        </p:nvCxnSpPr>
+        <p:spPr>
+          <a:xfrm flipH="1">
+            <a:off x="3980880" y="980728"/>
+            <a:ext cx="1224136" cy="5112568"/>
+          </a:xfrm>
+          <a:prstGeom prst="line">
+            <a:avLst/>
+          </a:prstGeom>
+          <a:ln w="19050">
+            <a:solidFill>
+              <a:schemeClr val="bg1"/>
+            </a:solidFill>
+            <a:prstDash val="lgDashDot"/>
+          </a:ln>
+        </p:spPr>
+        <p:style>
+          <a:lnRef idx="3">
+            <a:schemeClr val="dk1"/>
+          </a:lnRef>
+          <a:fillRef idx="0">
+            <a:schemeClr val="dk1"/>
+          </a:fillRef>
+          <a:effectRef idx="2">
+            <a:schemeClr val="dk1"/>
+          </a:effectRef>
+          <a:fontRef idx="minor">
+            <a:schemeClr val="tx1"/>
+          </a:fontRef>
+        </p:style>
+      </p:cxnSp>
+      <p:cxnSp>
+        <p:nvCxnSpPr>
+          <p:cNvPr id="35" name="Gerade Verbindung 34"/>
+          <p:cNvCxnSpPr/>
+          <p:nvPr/>
+        </p:nvCxnSpPr>
+        <p:spPr>
+          <a:xfrm flipH="1">
+            <a:off x="5810994" y="1564395"/>
+            <a:ext cx="2077083" cy="4168861"/>
+          </a:xfrm>
+          <a:prstGeom prst="line">
+            <a:avLst/>
+          </a:prstGeom>
+          <a:ln w="19050">
+            <a:solidFill>
+              <a:schemeClr val="bg1"/>
+            </a:solidFill>
+            <a:prstDash val="lgDashDot"/>
+          </a:ln>
+        </p:spPr>
+        <p:style>
+          <a:lnRef idx="3">
+            <a:schemeClr val="dk1"/>
+          </a:lnRef>
+          <a:fillRef idx="0">
+            <a:schemeClr val="dk1"/>
+          </a:fillRef>
+          <a:effectRef idx="2">
+            <a:schemeClr val="dk1"/>
+          </a:effectRef>
+          <a:fontRef idx="minor">
+            <a:schemeClr val="tx1"/>
+          </a:fontRef>
+        </p:style>
+      </p:cxnSp>
+      <p:sp>
+        <p:nvSpPr>
+          <p:cNvPr id="39" name="Textfeld 38"/>
+          <p:cNvSpPr txBox="1"/>
+          <p:nvPr/>
+        </p:nvSpPr>
+        <p:spPr>
+          <a:xfrm>
+            <a:off x="2038987" y="2511250"/>
+            <a:ext cx="1296144" cy="338554"/>
+          </a:xfrm>
+          <a:prstGeom prst="rect">
+            <a:avLst/>
+          </a:prstGeom>
+          <a:noFill/>
+        </p:spPr>
+        <p:txBody>
+          <a:bodyPr wrap="square" rtlCol="0">
+            <a:spAutoFit/>
+          </a:bodyPr>
+          <a:lstStyle/>
+          <a:p>
+            <a:r>
+              <a:rPr lang="de-CH" sz="1600" b="1" i="1" dirty="0" smtClean="0">
+                <a:solidFill>
+                  <a:srgbClr val="FFFF00"/>
+                </a:solidFill>
+                <a:latin typeface="Arial" panose="020B0604020202020204" pitchFamily="34" charset="0"/>
+                <a:cs typeface="Arial" panose="020B0604020202020204" pitchFamily="34" charset="0"/>
+              </a:rPr>
+              <a:t>Loop 2</a:t>
+            </a:r>
+            <a:endParaRPr lang="en-GB" sz="1600" b="1" i="1" dirty="0">
+              <a:solidFill>
+                <a:srgbClr val="FFFF00"/>
+              </a:solidFill>
+              <a:latin typeface="Arial" panose="020B0604020202020204" pitchFamily="34" charset="0"/>
+              <a:cs typeface="Arial" panose="020B0604020202020204" pitchFamily="34" charset="0"/>
+            </a:endParaRPr>
+          </a:p>
+        </p:txBody>
+      </p:sp>
+      <p:sp>
+        <p:nvSpPr>
+          <p:cNvPr id="40" name="Textfeld 39"/>
+          <p:cNvSpPr txBox="1"/>
+          <p:nvPr/>
+        </p:nvSpPr>
+        <p:spPr>
+          <a:xfrm>
+            <a:off x="4344959" y="836712"/>
+            <a:ext cx="1296144" cy="338554"/>
+          </a:xfrm>
+          <a:prstGeom prst="rect">
+            <a:avLst/>
+          </a:prstGeom>
+          <a:noFill/>
+        </p:spPr>
+        <p:txBody>
+          <a:bodyPr wrap="square" rtlCol="0">
+            <a:spAutoFit/>
+          </a:bodyPr>
+          <a:lstStyle/>
+          <a:p>
+            <a:r>
+              <a:rPr lang="de-CH" sz="1600" b="1" i="1" smtClean="0">
+                <a:solidFill>
+                  <a:srgbClr val="FFFF00"/>
+                </a:solidFill>
+                <a:latin typeface="Arial" panose="020B0604020202020204" pitchFamily="34" charset="0"/>
+                <a:cs typeface="Arial" panose="020B0604020202020204" pitchFamily="34" charset="0"/>
+              </a:rPr>
+              <a:t>Loop 1</a:t>
+            </a:r>
+            <a:endParaRPr lang="en-GB" sz="1600" b="1" i="1" dirty="0">
+              <a:solidFill>
+                <a:srgbClr val="FFFF00"/>
+              </a:solidFill>
+              <a:latin typeface="Arial" panose="020B0604020202020204" pitchFamily="34" charset="0"/>
+              <a:cs typeface="Arial" panose="020B0604020202020204" pitchFamily="34" charset="0"/>
+            </a:endParaRPr>
+          </a:p>
+        </p:txBody>
+      </p:sp>
+      <p:sp>
+        <p:nvSpPr>
+          <p:cNvPr id="41" name="Textfeld 40"/>
+          <p:cNvSpPr txBox="1"/>
+          <p:nvPr/>
+        </p:nvSpPr>
+        <p:spPr>
+          <a:xfrm>
+            <a:off x="7478758" y="3476152"/>
+            <a:ext cx="1296144" cy="338554"/>
+          </a:xfrm>
+          <a:prstGeom prst="rect">
+            <a:avLst/>
+          </a:prstGeom>
+          <a:noFill/>
+        </p:spPr>
+        <p:txBody>
+          <a:bodyPr wrap="square" rtlCol="0">
+            <a:spAutoFit/>
+          </a:bodyPr>
+          <a:lstStyle/>
+          <a:p>
+            <a:r>
+              <a:rPr lang="de-CH" sz="1600" b="1" i="1" dirty="0" smtClean="0">
+                <a:solidFill>
+                  <a:srgbClr val="FFFF00"/>
+                </a:solidFill>
+                <a:latin typeface="Arial" panose="020B0604020202020204" pitchFamily="34" charset="0"/>
+                <a:cs typeface="Arial" panose="020B0604020202020204" pitchFamily="34" charset="0"/>
+              </a:rPr>
+              <a:t>Loop 3</a:t>
+            </a:r>
+            <a:endParaRPr lang="en-GB" sz="1600" b="1" i="1" dirty="0">
+              <a:solidFill>
+                <a:srgbClr val="FFFF00"/>
+              </a:solidFill>
+              <a:latin typeface="Arial" panose="020B0604020202020204" pitchFamily="34" charset="0"/>
+              <a:cs typeface="Arial" panose="020B0604020202020204" pitchFamily="34" charset="0"/>
+            </a:endParaRPr>
+          </a:p>
+        </p:txBody>
+      </p:sp>
+      <p:sp>
+        <p:nvSpPr>
+          <p:cNvPr id="44" name="Textfeld 43"/>
+          <p:cNvSpPr txBox="1"/>
+          <p:nvPr/>
+        </p:nvSpPr>
+        <p:spPr>
+          <a:xfrm>
+            <a:off x="5969164" y="836712"/>
+            <a:ext cx="1296144" cy="338554"/>
+          </a:xfrm>
+          <a:prstGeom prst="rect">
+            <a:avLst/>
+          </a:prstGeom>
+          <a:noFill/>
+        </p:spPr>
+        <p:txBody>
+          <a:bodyPr wrap="square" rtlCol="0">
+            <a:spAutoFit/>
+          </a:bodyPr>
+          <a:lstStyle/>
+          <a:p>
+            <a:r>
+              <a:rPr lang="de-CH" sz="1600" b="1" i="1" dirty="0" smtClean="0">
+                <a:solidFill>
+                  <a:srgbClr val="FFFF00"/>
+                </a:solidFill>
+                <a:latin typeface="Arial" panose="020B0604020202020204" pitchFamily="34" charset="0"/>
+                <a:cs typeface="Arial" panose="020B0604020202020204" pitchFamily="34" charset="0"/>
+              </a:rPr>
+              <a:t>Loop 4</a:t>
+            </a:r>
+            <a:endParaRPr lang="en-GB" sz="1600" b="1" i="1" dirty="0">
+              <a:solidFill>
+                <a:srgbClr val="FFFF00"/>
+              </a:solidFill>
+              <a:latin typeface="Arial" panose="020B0604020202020204" pitchFamily="34" charset="0"/>
+              <a:cs typeface="Arial" panose="020B0604020202020204" pitchFamily="34" charset="0"/>
+            </a:endParaRPr>
+          </a:p>
+        </p:txBody>
+      </p:sp>
+      <p:sp>
+        <p:nvSpPr>
+          <p:cNvPr id="1034" name="Textfeld 1033"/>
+          <p:cNvSpPr txBox="1"/>
+          <p:nvPr/>
+        </p:nvSpPr>
+        <p:spPr>
+          <a:xfrm>
+            <a:off x="7550308" y="5805264"/>
+            <a:ext cx="1396092" cy="369332"/>
+          </a:xfrm>
+          <a:prstGeom prst="rect">
+            <a:avLst/>
+          </a:prstGeom>
+          <a:noFill/>
+        </p:spPr>
+        <p:txBody>
+          <a:bodyPr wrap="square" rtlCol="0">
+            <a:spAutoFit/>
+          </a:bodyPr>
+          <a:lstStyle/>
+          <a:p>
+            <a:r>
+              <a:rPr lang="de-CH" b="1" dirty="0" smtClean="0">
+                <a:solidFill>
+                  <a:prstClr val="white"/>
+                </a:solidFill>
+                <a:latin typeface="Arial" panose="020B0604020202020204" pitchFamily="34" charset="0"/>
+                <a:cs typeface="Arial" panose="020B0604020202020204" pitchFamily="34" charset="0"/>
+              </a:rPr>
+              <a:t>INTERIOR</a:t>
+            </a:r>
+            <a:endParaRPr lang="en-GB" sz="1600" b="1" dirty="0">
+              <a:solidFill>
+                <a:prstClr val="white"/>
+              </a:solidFill>
+              <a:latin typeface="Arial" panose="020B0604020202020204" pitchFamily="34" charset="0"/>
+              <a:cs typeface="Arial" panose="020B0604020202020204" pitchFamily="34" charset="0"/>
+            </a:endParaRPr>
+          </a:p>
+        </p:txBody>
+      </p:sp>
+      <p:sp>
+        <p:nvSpPr>
+          <p:cNvPr id="50" name="Textfeld 49"/>
+          <p:cNvSpPr txBox="1"/>
+          <p:nvPr/>
+        </p:nvSpPr>
+        <p:spPr>
+          <a:xfrm>
+            <a:off x="7550308" y="836712"/>
+            <a:ext cx="1353096" cy="369332"/>
+          </a:xfrm>
+          <a:prstGeom prst="rect">
+            <a:avLst/>
+          </a:prstGeom>
+          <a:noFill/>
+        </p:spPr>
+        <p:txBody>
+          <a:bodyPr wrap="square" rtlCol="0">
+            <a:spAutoFit/>
+          </a:bodyPr>
+          <a:lstStyle/>
+          <a:p>
+            <a:r>
+              <a:rPr lang="de-CH" b="1" dirty="0" smtClean="0">
+                <a:solidFill>
+                  <a:prstClr val="white"/>
+                </a:solidFill>
+                <a:latin typeface="Arial" panose="020B0604020202020204" pitchFamily="34" charset="0"/>
+                <a:cs typeface="Arial" panose="020B0604020202020204" pitchFamily="34" charset="0"/>
+              </a:rPr>
+              <a:t>EXTERIOR</a:t>
+            </a:r>
+            <a:endParaRPr lang="en-GB" sz="1600" b="1" dirty="0">
+              <a:solidFill>
+                <a:prstClr val="white"/>
+              </a:solidFill>
+              <a:latin typeface="Arial" panose="020B0604020202020204" pitchFamily="34" charset="0"/>
+              <a:cs typeface="Arial" panose="020B0604020202020204" pitchFamily="34" charset="0"/>
+            </a:endParaRPr>
+          </a:p>
+        </p:txBody>
+      </p:sp>
+      <p:pic>
+        <p:nvPicPr>
+          <p:cNvPr id="32" name="Picture 5" descr="E:\5-fold.png"/>
+          <p:cNvPicPr>
+            <a:picLocks noChangeAspect="1" noChangeArrowheads="1"/>
+          </p:cNvPicPr>
+          <p:nvPr/>
+        </p:nvPicPr>
+        <p:blipFill>
+          <a:blip r:embed="rId3" cstate="print">
+            <a:extLst>
+              <a:ext uri="{28A0092B-C50C-407E-A947-70E740481C1C}">
+                <a14:useLocalDpi xmlns:a14="http://schemas.microsoft.com/office/drawing/2010/main" val="0"/>
+              </a:ext>
+            </a:extLst>
+          </a:blip>
+          <a:srcRect/>
+          <a:stretch>
+            <a:fillRect/>
+          </a:stretch>
+        </p:blipFill>
+        <p:spPr bwMode="auto">
+          <a:xfrm>
+            <a:off x="2494401" y="9688308"/>
+            <a:ext cx="2268375" cy="2669684"/>
+          </a:xfrm>
+          <a:prstGeom prst="rect">
+            <a:avLst/>
+          </a:prstGeom>
+          <a:noFill/>
+          <a:extLst>
+            <a:ext uri="{909E8E84-426E-40DD-AFC4-6F175D3DCCD1}">
+              <a14:hiddenFill xmlns:a14="http://schemas.microsoft.com/office/drawing/2010/main">
+                <a:solidFill>
+                  <a:srgbClr val="FFFFFF"/>
+                </a:solidFill>
+              </a14:hiddenFill>
+            </a:ext>
+          </a:extLst>
+        </p:spPr>
+      </p:pic>
+      <p:pic>
+        <p:nvPicPr>
+          <p:cNvPr id="33" name="Picture 4" descr="E:\3-fold.png"/>
+          <p:cNvPicPr>
+            <a:picLocks noChangeAspect="1" noChangeArrowheads="1"/>
+          </p:cNvPicPr>
+          <p:nvPr/>
+        </p:nvPicPr>
+        <p:blipFill>
+          <a:blip r:embed="rId4" cstate="print">
+            <a:extLst>
+              <a:ext uri="{28A0092B-C50C-407E-A947-70E740481C1C}">
+                <a14:useLocalDpi xmlns:a14="http://schemas.microsoft.com/office/drawing/2010/main" val="0"/>
+              </a:ext>
+            </a:extLst>
+          </a:blip>
+          <a:srcRect/>
+          <a:stretch>
+            <a:fillRect/>
+          </a:stretch>
+        </p:blipFill>
+        <p:spPr bwMode="auto">
+          <a:xfrm rot="354250">
+            <a:off x="2482971" y="6774796"/>
+            <a:ext cx="2269663" cy="2671200"/>
+          </a:xfrm>
+          <a:prstGeom prst="rect">
+            <a:avLst/>
+          </a:prstGeom>
+          <a:noFill/>
+          <a:extLst>
+            <a:ext uri="{909E8E84-426E-40DD-AFC4-6F175D3DCCD1}">
+              <a14:hiddenFill xmlns:a14="http://schemas.microsoft.com/office/drawing/2010/main">
+                <a:solidFill>
+                  <a:srgbClr val="FFFFFF"/>
+                </a:solidFill>
+              </a14:hiddenFill>
+            </a:ext>
+          </a:extLst>
+        </p:spPr>
+      </p:pic>
+      <p:cxnSp>
+        <p:nvCxnSpPr>
+          <p:cNvPr id="34" name="Gerade Verbindung 33"/>
+          <p:cNvCxnSpPr/>
+          <p:nvPr/>
+        </p:nvCxnSpPr>
+        <p:spPr>
+          <a:xfrm flipH="1">
+            <a:off x="1256626" y="6905788"/>
+            <a:ext cx="2027654" cy="1436512"/>
+          </a:xfrm>
+          <a:prstGeom prst="line">
+            <a:avLst/>
+          </a:prstGeom>
+          <a:ln w="19050">
+            <a:prstDash val="dash"/>
+          </a:ln>
+        </p:spPr>
+        <p:style>
+          <a:lnRef idx="1">
+            <a:schemeClr val="dk1"/>
+          </a:lnRef>
+          <a:fillRef idx="0">
+            <a:schemeClr val="dk1"/>
+          </a:fillRef>
+          <a:effectRef idx="0">
+            <a:schemeClr val="dk1"/>
+          </a:effectRef>
+          <a:fontRef idx="minor">
+            <a:schemeClr val="tx1"/>
+          </a:fontRef>
+        </p:style>
+      </p:cxnSp>
+      <p:sp>
+        <p:nvSpPr>
+          <p:cNvPr id="36" name="Gleichschenkliges Dreieck 35"/>
+          <p:cNvSpPr/>
+          <p:nvPr/>
+        </p:nvSpPr>
+        <p:spPr>
+          <a:xfrm rot="10800000">
+            <a:off x="3119613" y="7758950"/>
+            <a:ext cx="1044000" cy="950834"/>
+          </a:xfrm>
+          <a:prstGeom prst="triangle">
+            <a:avLst/>
+          </a:prstGeom>
+          <a:noFill/>
+          <a:ln w="38100">
+            <a:solidFill>
+              <a:schemeClr val="tx1"/>
+            </a:solidFill>
+          </a:ln>
+        </p:spPr>
+        <p:style>
+          <a:lnRef idx="2">
+            <a:schemeClr val="accent1">
+              <a:shade val="50000"/>
+            </a:schemeClr>
+          </a:lnRef>
+          <a:fillRef idx="1">
+            <a:schemeClr val="accent1"/>
+          </a:fillRef>
+          <a:effectRef idx="0">
+            <a:schemeClr val="accent1"/>
+          </a:effectRef>
+          <a:fontRef idx="minor">
+            <a:schemeClr val="lt1"/>
+          </a:fontRef>
+        </p:style>
+        <p:txBody>
+          <a:bodyPr rtlCol="0" anchor="ctr"/>
+          <a:lstStyle/>
+          <a:p>
+            <a:pPr algn="ctr"/>
+            <a:endParaRPr lang="en-GB">
+              <a:solidFill>
+                <a:schemeClr val="bg1"/>
+              </a:solidFill>
+              <a:latin typeface="Arial" panose="020B0604020202020204" pitchFamily="34" charset="0"/>
+              <a:cs typeface="Arial" panose="020B0604020202020204" pitchFamily="34" charset="0"/>
+            </a:endParaRPr>
+          </a:p>
+        </p:txBody>
+      </p:sp>
+      <p:sp>
+        <p:nvSpPr>
+          <p:cNvPr id="37" name="Regelmäßiges Fünfeck 36"/>
+          <p:cNvSpPr/>
+          <p:nvPr/>
+        </p:nvSpPr>
+        <p:spPr>
+          <a:xfrm>
+            <a:off x="2987027" y="10310092"/>
+            <a:ext cx="1368152" cy="1296144"/>
+          </a:xfrm>
+          <a:prstGeom prst="pentagon">
+            <a:avLst/>
+          </a:prstGeom>
+          <a:noFill/>
+          <a:ln w="38100">
+            <a:solidFill>
+              <a:srgbClr val="0000CC"/>
+            </a:solidFill>
+            <a:prstDash val="dash"/>
+          </a:ln>
+        </p:spPr>
+        <p:style>
+          <a:lnRef idx="2">
+            <a:schemeClr val="accent1">
+              <a:shade val="50000"/>
+            </a:schemeClr>
+          </a:lnRef>
+          <a:fillRef idx="1">
+            <a:schemeClr val="accent1"/>
+          </a:fillRef>
+          <a:effectRef idx="0">
+            <a:schemeClr val="accent1"/>
+          </a:effectRef>
+          <a:fontRef idx="minor">
+            <a:schemeClr val="lt1"/>
+          </a:fontRef>
+        </p:style>
+        <p:txBody>
+          <a:bodyPr rtlCol="0" anchor="ctr"/>
+          <a:lstStyle/>
+          <a:p>
+            <a:pPr algn="ctr"/>
+            <a:endParaRPr lang="en-GB">
+              <a:latin typeface="Arial" panose="020B0604020202020204" pitchFamily="34" charset="0"/>
+              <a:cs typeface="Arial" panose="020B0604020202020204" pitchFamily="34" charset="0"/>
+            </a:endParaRPr>
+          </a:p>
+        </p:txBody>
+      </p:sp>
+      <p:pic>
+        <p:nvPicPr>
+          <p:cNvPr id="38" name="Picture 3"/>
+          <p:cNvPicPr>
+            <a:picLocks noChangeAspect="1" noChangeArrowheads="1"/>
+          </p:cNvPicPr>
+          <p:nvPr/>
+        </p:nvPicPr>
+        <p:blipFill rotWithShape="1">
+          <a:blip r:embed="rId5" cstate="print">
+            <a:extLst>
+              <a:ext uri="{28A0092B-C50C-407E-A947-70E740481C1C}">
+                <a14:useLocalDpi xmlns:a14="http://schemas.microsoft.com/office/drawing/2010/main" val="0"/>
+              </a:ext>
+            </a:extLst>
+          </a:blip>
+          <a:srcRect r="17181"/>
+          <a:stretch/>
+        </p:blipFill>
+        <p:spPr bwMode="auto">
+          <a:xfrm>
+            <a:off x="222226" y="8365876"/>
+            <a:ext cx="2088232" cy="2558901"/>
+          </a:xfrm>
+          <a:prstGeom prst="rect">
+            <a:avLst/>
+          </a:prstGeom>
+          <a:noFill/>
+          <a:ln>
+            <a:noFill/>
+          </a:ln>
+          <a:effectLst/>
+          <a:extLst>
+            <a:ext uri="{909E8E84-426E-40DD-AFC4-6F175D3DCCD1}">
+              <a14:hiddenFill xmlns:a14="http://schemas.microsoft.com/office/drawing/2010/main">
+                <a:solidFill>
+                  <a:schemeClr val="accent1"/>
+                </a:solidFill>
+              </a14:hiddenFill>
+            </a:ext>
+            <a:ext uri="{91240B29-F687-4F45-9708-019B960494DF}">
+              <a14:hiddenLine xmlns:a14="http://schemas.microsoft.com/office/drawing/2010/main" w="9525">
+                <a:solidFill>
+                  <a:schemeClr val="tx1"/>
+                </a:solidFill>
+                <a:miter lim="800000"/>
+                <a:headEnd/>
+                <a:tailEnd/>
+              </a14:hiddenLine>
+            </a:ext>
+            <a:ext uri="{AF507438-7753-43E0-B8FC-AC1667EBCBE1}">
+              <a14:hiddenEffects xmlns:a14="http://schemas.microsoft.com/office/drawing/2010/main">
+                <a:effectLst>
+                  <a:outerShdw dist="35921" dir="2700000" algn="ctr" rotWithShape="0">
+                    <a:schemeClr val="bg2"/>
+                  </a:outerShdw>
+                </a:effectLst>
+              </a14:hiddenEffects>
+            </a:ext>
+          </a:extLst>
+        </p:spPr>
+      </p:pic>
+      <p:sp>
+        <p:nvSpPr>
+          <p:cNvPr id="42" name="Textfeld 41"/>
+          <p:cNvSpPr txBox="1"/>
+          <p:nvPr/>
+        </p:nvSpPr>
+        <p:spPr>
+          <a:xfrm>
+            <a:off x="1064458" y="9557860"/>
+            <a:ext cx="432048" cy="307777"/>
+          </a:xfrm>
+          <a:prstGeom prst="rect">
+            <a:avLst/>
+          </a:prstGeom>
+          <a:noFill/>
+        </p:spPr>
+        <p:txBody>
+          <a:bodyPr wrap="square" rtlCol="0">
+            <a:spAutoFit/>
+          </a:bodyPr>
+          <a:lstStyle/>
+          <a:p>
+            <a:r>
+              <a:rPr lang="de-CH" sz="1400" b="1" dirty="0" smtClean="0">
+                <a:latin typeface="Arial" panose="020B0604020202020204" pitchFamily="34" charset="0"/>
+                <a:cs typeface="Arial" panose="020B0604020202020204" pitchFamily="34" charset="0"/>
+              </a:rPr>
+              <a:t>3f</a:t>
+            </a:r>
+            <a:endParaRPr lang="en-GB" b="1" dirty="0">
+              <a:latin typeface="Arial" panose="020B0604020202020204" pitchFamily="34" charset="0"/>
+              <a:cs typeface="Arial" panose="020B0604020202020204" pitchFamily="34" charset="0"/>
+            </a:endParaRPr>
+          </a:p>
+        </p:txBody>
+      </p:sp>
+      <p:sp>
+        <p:nvSpPr>
+          <p:cNvPr id="43" name="Textfeld 42"/>
+          <p:cNvSpPr txBox="1"/>
+          <p:nvPr/>
+        </p:nvSpPr>
+        <p:spPr>
+          <a:xfrm>
+            <a:off x="1446362" y="9148672"/>
+            <a:ext cx="432048" cy="307777"/>
+          </a:xfrm>
+          <a:prstGeom prst="rect">
+            <a:avLst/>
+          </a:prstGeom>
+          <a:noFill/>
+        </p:spPr>
+        <p:txBody>
+          <a:bodyPr wrap="square" rtlCol="0">
+            <a:spAutoFit/>
+          </a:bodyPr>
+          <a:lstStyle/>
+          <a:p>
+            <a:r>
+              <a:rPr lang="de-CH" sz="1400" b="1" dirty="0">
+                <a:latin typeface="Arial" panose="020B0604020202020204" pitchFamily="34" charset="0"/>
+                <a:cs typeface="Arial" panose="020B0604020202020204" pitchFamily="34" charset="0"/>
+              </a:rPr>
+              <a:t>5</a:t>
+            </a:r>
+            <a:r>
+              <a:rPr lang="de-CH" sz="1400" b="1" dirty="0" smtClean="0">
+                <a:latin typeface="Arial" panose="020B0604020202020204" pitchFamily="34" charset="0"/>
+                <a:cs typeface="Arial" panose="020B0604020202020204" pitchFamily="34" charset="0"/>
+              </a:rPr>
+              <a:t>f</a:t>
+            </a:r>
+            <a:endParaRPr lang="en-GB" b="1" dirty="0">
+              <a:latin typeface="Arial" panose="020B0604020202020204" pitchFamily="34" charset="0"/>
+              <a:cs typeface="Arial" panose="020B0604020202020204" pitchFamily="34" charset="0"/>
+            </a:endParaRPr>
+          </a:p>
+        </p:txBody>
+      </p:sp>
+      <p:sp>
+        <p:nvSpPr>
+          <p:cNvPr id="45" name="Textfeld 44"/>
+          <p:cNvSpPr txBox="1"/>
+          <p:nvPr/>
+        </p:nvSpPr>
+        <p:spPr>
+          <a:xfrm>
+            <a:off x="945784" y="9132259"/>
+            <a:ext cx="432048" cy="307777"/>
+          </a:xfrm>
+          <a:prstGeom prst="rect">
+            <a:avLst/>
+          </a:prstGeom>
+          <a:noFill/>
+        </p:spPr>
+        <p:txBody>
+          <a:bodyPr wrap="square" rtlCol="0">
+            <a:spAutoFit/>
+          </a:bodyPr>
+          <a:lstStyle/>
+          <a:p>
+            <a:r>
+              <a:rPr lang="de-CH" sz="1400" b="1" dirty="0">
+                <a:latin typeface="Arial" panose="020B0604020202020204" pitchFamily="34" charset="0"/>
+                <a:cs typeface="Arial" panose="020B0604020202020204" pitchFamily="34" charset="0"/>
+              </a:rPr>
+              <a:t>2</a:t>
+            </a:r>
+            <a:r>
+              <a:rPr lang="de-CH" sz="1400" b="1" dirty="0" smtClean="0">
+                <a:latin typeface="Arial" panose="020B0604020202020204" pitchFamily="34" charset="0"/>
+                <a:cs typeface="Arial" panose="020B0604020202020204" pitchFamily="34" charset="0"/>
+              </a:rPr>
+              <a:t>f</a:t>
+            </a:r>
+            <a:endParaRPr lang="en-GB" b="1" dirty="0">
+              <a:latin typeface="Arial" panose="020B0604020202020204" pitchFamily="34" charset="0"/>
+              <a:cs typeface="Arial" panose="020B0604020202020204" pitchFamily="34" charset="0"/>
+            </a:endParaRPr>
+          </a:p>
+        </p:txBody>
+      </p:sp>
+      <p:sp>
+        <p:nvSpPr>
+          <p:cNvPr id="46" name="Textfeld 45"/>
+          <p:cNvSpPr txBox="1"/>
+          <p:nvPr/>
+        </p:nvSpPr>
+        <p:spPr>
+          <a:xfrm>
+            <a:off x="3189412" y="6755412"/>
+            <a:ext cx="1114410" cy="338554"/>
+          </a:xfrm>
+          <a:prstGeom prst="rect">
+            <a:avLst/>
+          </a:prstGeom>
+          <a:noFill/>
+        </p:spPr>
+        <p:txBody>
+          <a:bodyPr wrap="square" rtlCol="0">
+            <a:spAutoFit/>
+          </a:bodyPr>
+          <a:lstStyle/>
+          <a:p>
+            <a:pPr algn="ctr"/>
+            <a:r>
+              <a:rPr lang="en-US" sz="1600" b="1" dirty="0" smtClean="0">
+                <a:latin typeface="Arial" panose="020B0604020202020204" pitchFamily="34" charset="0"/>
+                <a:cs typeface="Arial" panose="020B0604020202020204" pitchFamily="34" charset="0"/>
+              </a:rPr>
+              <a:t>Trimer</a:t>
+            </a:r>
+            <a:endParaRPr lang="en-US" b="1" dirty="0">
+              <a:latin typeface="Arial" panose="020B0604020202020204" pitchFamily="34" charset="0"/>
+              <a:cs typeface="Arial" panose="020B0604020202020204" pitchFamily="34" charset="0"/>
+            </a:endParaRPr>
+          </a:p>
+        </p:txBody>
+      </p:sp>
+      <p:sp>
+        <p:nvSpPr>
+          <p:cNvPr id="47" name="Textfeld 46"/>
+          <p:cNvSpPr txBox="1"/>
+          <p:nvPr/>
+        </p:nvSpPr>
+        <p:spPr>
+          <a:xfrm>
+            <a:off x="3189412" y="9529434"/>
+            <a:ext cx="1114410" cy="338554"/>
+          </a:xfrm>
+          <a:prstGeom prst="rect">
+            <a:avLst/>
+          </a:prstGeom>
+          <a:noFill/>
+        </p:spPr>
+        <p:txBody>
+          <a:bodyPr wrap="square" rtlCol="0">
+            <a:spAutoFit/>
+          </a:bodyPr>
+          <a:lstStyle/>
+          <a:p>
+            <a:pPr algn="ctr"/>
+            <a:r>
+              <a:rPr lang="en-US" sz="1600" b="1" dirty="0" err="1" smtClean="0">
+                <a:latin typeface="Arial" panose="020B0604020202020204" pitchFamily="34" charset="0"/>
+                <a:cs typeface="Arial" panose="020B0604020202020204" pitchFamily="34" charset="0"/>
+              </a:rPr>
+              <a:t>Pentamer</a:t>
+            </a:r>
+            <a:endParaRPr lang="en-US" b="1" dirty="0">
+              <a:latin typeface="Arial" panose="020B0604020202020204" pitchFamily="34" charset="0"/>
+              <a:cs typeface="Arial" panose="020B0604020202020204" pitchFamily="34" charset="0"/>
+            </a:endParaRPr>
+          </a:p>
+        </p:txBody>
+      </p:sp>
+      <p:cxnSp>
+        <p:nvCxnSpPr>
+          <p:cNvPr id="48" name="Gerade Verbindung 47"/>
+          <p:cNvCxnSpPr/>
+          <p:nvPr/>
+        </p:nvCxnSpPr>
+        <p:spPr>
+          <a:xfrm flipH="1" flipV="1">
+            <a:off x="1256626" y="10730710"/>
+            <a:ext cx="2027654" cy="1436512"/>
+          </a:xfrm>
+          <a:prstGeom prst="line">
+            <a:avLst/>
+          </a:prstGeom>
+          <a:ln w="19050">
+            <a:prstDash val="dash"/>
+          </a:ln>
+        </p:spPr>
+        <p:style>
+          <a:lnRef idx="1">
+            <a:schemeClr val="dk1"/>
+          </a:lnRef>
+          <a:fillRef idx="0">
+            <a:schemeClr val="dk1"/>
+          </a:fillRef>
+          <a:effectRef idx="0">
+            <a:schemeClr val="dk1"/>
+          </a:effectRef>
+          <a:fontRef idx="minor">
+            <a:schemeClr val="tx1"/>
+          </a:fontRef>
+        </p:style>
+      </p:cxnSp>
+      <p:pic>
+        <p:nvPicPr>
+          <p:cNvPr id="49" name="Picture 2"/>
+          <p:cNvPicPr>
+            <a:picLocks noChangeAspect="1" noChangeArrowheads="1"/>
+          </p:cNvPicPr>
+          <p:nvPr/>
+        </p:nvPicPr>
+        <p:blipFill rotWithShape="1">
+          <a:blip r:embed="rId6">
+            <a:extLst>
+              <a:ext uri="{28A0092B-C50C-407E-A947-70E740481C1C}">
+                <a14:useLocalDpi xmlns:a14="http://schemas.microsoft.com/office/drawing/2010/main" val="0"/>
+              </a:ext>
+            </a:extLst>
+          </a:blip>
+          <a:srcRect l="35918" t="6958" r="18807" b="19080"/>
+          <a:stretch/>
+        </p:blipFill>
+        <p:spPr bwMode="auto">
+          <a:xfrm>
+            <a:off x="5199853" y="8988889"/>
+            <a:ext cx="3692628" cy="2337241"/>
+          </a:xfrm>
+          <a:prstGeom prst="rect">
+            <a:avLst/>
+          </a:prstGeom>
+          <a:noFill/>
+          <a:ln>
+            <a:noFill/>
+          </a:ln>
+          <a:extLst>
+            <a:ext uri="{909E8E84-426E-40DD-AFC4-6F175D3DCCD1}">
+              <a14:hiddenFill xmlns:a14="http://schemas.microsoft.com/office/drawing/2010/main">
+                <a:solidFill>
+                  <a:schemeClr val="accent1"/>
+                </a:solidFill>
+              </a14:hiddenFill>
+            </a:ext>
+            <a:ext uri="{91240B29-F687-4F45-9708-019B960494DF}">
+              <a14:hiddenLine xmlns:a14="http://schemas.microsoft.com/office/drawing/2010/main" w="9525">
+                <a:solidFill>
+                  <a:schemeClr val="tx1"/>
+                </a:solidFill>
+                <a:miter lim="800000"/>
+                <a:headEnd/>
+                <a:tailEnd/>
+              </a14:hiddenLine>
+            </a:ext>
+          </a:extLst>
+        </p:spPr>
+      </p:pic>
+      <p:sp>
+        <p:nvSpPr>
+          <p:cNvPr id="52" name="Textfeld 51"/>
+          <p:cNvSpPr txBox="1"/>
+          <p:nvPr/>
+        </p:nvSpPr>
+        <p:spPr>
+          <a:xfrm>
+            <a:off x="5651332" y="11271149"/>
+            <a:ext cx="1800200" cy="338554"/>
+          </a:xfrm>
+          <a:prstGeom prst="rect">
+            <a:avLst/>
+          </a:prstGeom>
+          <a:noFill/>
+        </p:spPr>
+        <p:txBody>
+          <a:bodyPr wrap="square" rtlCol="0">
+            <a:spAutoFit/>
+          </a:bodyPr>
+          <a:lstStyle/>
+          <a:p>
+            <a:r>
+              <a:rPr lang="de-CH" sz="1600" b="1" dirty="0" smtClean="0">
+                <a:latin typeface="Arial" panose="020B0604020202020204" pitchFamily="34" charset="0"/>
+                <a:cs typeface="Arial" panose="020B0604020202020204" pitchFamily="34" charset="0"/>
+              </a:rPr>
+              <a:t>C-terminus</a:t>
+            </a:r>
+            <a:endParaRPr lang="en-GB" b="1" dirty="0">
+              <a:latin typeface="Arial" panose="020B0604020202020204" pitchFamily="34" charset="0"/>
+              <a:cs typeface="Arial" panose="020B0604020202020204" pitchFamily="34" charset="0"/>
+            </a:endParaRPr>
+          </a:p>
+        </p:txBody>
+      </p:sp>
+      <p:sp>
+        <p:nvSpPr>
+          <p:cNvPr id="53" name="Rechteck 52"/>
+          <p:cNvSpPr/>
+          <p:nvPr/>
+        </p:nvSpPr>
+        <p:spPr>
+          <a:xfrm>
+            <a:off x="5518737" y="8824212"/>
+            <a:ext cx="360040" cy="144016"/>
+          </a:xfrm>
+          <a:prstGeom prst="rect">
+            <a:avLst/>
+          </a:prstGeom>
+          <a:solidFill>
+            <a:schemeClr val="bg1"/>
+          </a:solidFill>
+          <a:ln>
+            <a:solidFill>
+              <a:schemeClr val="bg1"/>
+            </a:solidFill>
+          </a:ln>
+        </p:spPr>
+        <p:style>
+          <a:lnRef idx="2">
+            <a:schemeClr val="accent1">
+              <a:shade val="50000"/>
+            </a:schemeClr>
+          </a:lnRef>
+          <a:fillRef idx="1">
+            <a:schemeClr val="accent1"/>
+          </a:fillRef>
+          <a:effectRef idx="0">
+            <a:schemeClr val="accent1"/>
+          </a:effectRef>
+          <a:fontRef idx="minor">
+            <a:schemeClr val="lt1"/>
+          </a:fontRef>
+        </p:style>
+        <p:txBody>
+          <a:bodyPr rtlCol="0" anchor="ctr"/>
+          <a:lstStyle/>
+          <a:p>
+            <a:pPr algn="ctr"/>
+            <a:endParaRPr lang="en-GB">
+              <a:latin typeface="Arial" panose="020B0604020202020204" pitchFamily="34" charset="0"/>
+              <a:cs typeface="Arial" panose="020B0604020202020204" pitchFamily="34" charset="0"/>
+            </a:endParaRPr>
+          </a:p>
+        </p:txBody>
+      </p:sp>
+      <p:sp>
+        <p:nvSpPr>
+          <p:cNvPr id="54" name="Gleichschenkliges Dreieck 53"/>
+          <p:cNvSpPr/>
+          <p:nvPr/>
+        </p:nvSpPr>
+        <p:spPr>
+          <a:xfrm>
+            <a:off x="1174286" y="9456396"/>
+            <a:ext cx="144000" cy="144000"/>
+          </a:xfrm>
+          <a:prstGeom prst="triangle">
+            <a:avLst/>
+          </a:prstGeom>
+          <a:ln>
+            <a:noFill/>
+          </a:ln>
+        </p:spPr>
+        <p:style>
+          <a:lnRef idx="2">
+            <a:schemeClr val="dk1">
+              <a:shade val="50000"/>
+            </a:schemeClr>
+          </a:lnRef>
+          <a:fillRef idx="1">
+            <a:schemeClr val="dk1"/>
+          </a:fillRef>
+          <a:effectRef idx="0">
+            <a:schemeClr val="dk1"/>
+          </a:effectRef>
+          <a:fontRef idx="minor">
+            <a:schemeClr val="lt1"/>
+          </a:fontRef>
+        </p:style>
+        <p:txBody>
+          <a:bodyPr rtlCol="0" anchor="ctr"/>
+          <a:lstStyle/>
+          <a:p>
+            <a:pPr algn="ctr"/>
+            <a:endParaRPr lang="de-DE">
+              <a:latin typeface="Arial" panose="020B0604020202020204" pitchFamily="34" charset="0"/>
+              <a:cs typeface="Arial" panose="020B0604020202020204" pitchFamily="34" charset="0"/>
+            </a:endParaRPr>
+          </a:p>
+        </p:txBody>
+      </p:sp>
+      <p:sp>
+        <p:nvSpPr>
+          <p:cNvPr id="55" name="Ellipse 54"/>
+          <p:cNvSpPr/>
+          <p:nvPr/>
+        </p:nvSpPr>
+        <p:spPr>
+          <a:xfrm>
+            <a:off x="1210184" y="9132768"/>
+            <a:ext cx="76633" cy="144000"/>
+          </a:xfrm>
+          <a:prstGeom prst="ellipse">
+            <a:avLst/>
+          </a:prstGeom>
+          <a:solidFill>
+            <a:schemeClr val="tx1"/>
+          </a:solidFill>
+          <a:ln>
+            <a:noFill/>
+          </a:ln>
+        </p:spPr>
+        <p:style>
+          <a:lnRef idx="2">
+            <a:schemeClr val="accent1">
+              <a:shade val="50000"/>
+            </a:schemeClr>
+          </a:lnRef>
+          <a:fillRef idx="1">
+            <a:schemeClr val="accent1"/>
+          </a:fillRef>
+          <a:effectRef idx="0">
+            <a:schemeClr val="accent1"/>
+          </a:effectRef>
+          <a:fontRef idx="minor">
+            <a:schemeClr val="lt1"/>
+          </a:fontRef>
+        </p:style>
+        <p:txBody>
+          <a:bodyPr rtlCol="0" anchor="ctr"/>
+          <a:lstStyle/>
+          <a:p>
+            <a:pPr algn="ctr"/>
+            <a:endParaRPr lang="de-DE">
+              <a:latin typeface="Arial" panose="020B0604020202020204" pitchFamily="34" charset="0"/>
+              <a:cs typeface="Arial" panose="020B0604020202020204" pitchFamily="34" charset="0"/>
+            </a:endParaRPr>
+          </a:p>
+        </p:txBody>
+      </p:sp>
+      <p:sp>
+        <p:nvSpPr>
+          <p:cNvPr id="56" name="Regelmäßiges Fünfeck 55"/>
+          <p:cNvSpPr/>
+          <p:nvPr/>
+        </p:nvSpPr>
+        <p:spPr>
+          <a:xfrm rot="20856874">
+            <a:off x="1730418" y="9143044"/>
+            <a:ext cx="144016" cy="144000"/>
+          </a:xfrm>
+          <a:prstGeom prst="pentagon">
+            <a:avLst/>
+          </a:prstGeom>
+          <a:solidFill>
+            <a:schemeClr val="tx1"/>
+          </a:solidFill>
+          <a:ln>
+            <a:noFill/>
+          </a:ln>
+        </p:spPr>
+        <p:style>
+          <a:lnRef idx="2">
+            <a:schemeClr val="accent1">
+              <a:shade val="50000"/>
+            </a:schemeClr>
+          </a:lnRef>
+          <a:fillRef idx="1">
+            <a:schemeClr val="accent1"/>
+          </a:fillRef>
+          <a:effectRef idx="0">
+            <a:schemeClr val="accent1"/>
+          </a:effectRef>
+          <a:fontRef idx="minor">
+            <a:schemeClr val="lt1"/>
+          </a:fontRef>
+        </p:style>
+        <p:txBody>
+          <a:bodyPr rtlCol="0" anchor="ctr"/>
+          <a:lstStyle/>
+          <a:p>
+            <a:pPr algn="ctr"/>
+            <a:endParaRPr lang="de-DE">
+              <a:latin typeface="Arial" panose="020B0604020202020204" pitchFamily="34" charset="0"/>
+              <a:cs typeface="Arial" panose="020B0604020202020204" pitchFamily="34" charset="0"/>
+            </a:endParaRPr>
+          </a:p>
+        </p:txBody>
+      </p:sp>
+      <p:sp>
+        <p:nvSpPr>
+          <p:cNvPr id="57" name="Textfeld 56"/>
+          <p:cNvSpPr txBox="1"/>
+          <p:nvPr/>
+        </p:nvSpPr>
+        <p:spPr>
+          <a:xfrm>
+            <a:off x="-252536" y="378743"/>
+            <a:ext cx="288032" cy="400110"/>
+          </a:xfrm>
+          <a:prstGeom prst="rect">
+            <a:avLst/>
+          </a:prstGeom>
+          <a:noFill/>
+        </p:spPr>
+        <p:txBody>
+          <a:bodyPr wrap="square" rtlCol="0">
+            <a:spAutoFit/>
+          </a:bodyPr>
+          <a:lstStyle/>
+          <a:p>
+            <a:r>
+              <a:rPr lang="de-CH" sz="2000" b="1" dirty="0" smtClean="0">
+                <a:latin typeface="Arial" panose="020B0604020202020204" pitchFamily="34" charset="0"/>
+                <a:cs typeface="Arial" panose="020B0604020202020204" pitchFamily="34" charset="0"/>
+              </a:rPr>
+              <a:t>A</a:t>
+            </a:r>
+            <a:endParaRPr lang="en-GB" sz="2000" b="1" dirty="0">
+              <a:latin typeface="Arial" panose="020B0604020202020204" pitchFamily="34" charset="0"/>
+              <a:cs typeface="Arial" panose="020B0604020202020204" pitchFamily="34" charset="0"/>
+            </a:endParaRPr>
+          </a:p>
+        </p:txBody>
+      </p:sp>
+      <p:sp>
+        <p:nvSpPr>
+          <p:cNvPr id="58" name="Textfeld 57"/>
+          <p:cNvSpPr txBox="1"/>
+          <p:nvPr/>
+        </p:nvSpPr>
+        <p:spPr>
+          <a:xfrm>
+            <a:off x="-252536" y="6705743"/>
+            <a:ext cx="288032" cy="400110"/>
+          </a:xfrm>
+          <a:prstGeom prst="rect">
+            <a:avLst/>
+          </a:prstGeom>
+          <a:noFill/>
+        </p:spPr>
+        <p:txBody>
+          <a:bodyPr wrap="square" rtlCol="0">
+            <a:spAutoFit/>
+          </a:bodyPr>
+          <a:lstStyle/>
+          <a:p>
+            <a:r>
+              <a:rPr lang="de-CH" sz="2000" b="1" dirty="0" smtClean="0">
+                <a:latin typeface="Arial" panose="020B0604020202020204" pitchFamily="34" charset="0"/>
+                <a:cs typeface="Arial" panose="020B0604020202020204" pitchFamily="34" charset="0"/>
+              </a:rPr>
+              <a:t>B</a:t>
+            </a:r>
+            <a:endParaRPr lang="en-GB" sz="2000" b="1" dirty="0">
+              <a:latin typeface="Arial" panose="020B0604020202020204" pitchFamily="34" charset="0"/>
+              <a:cs typeface="Arial" panose="020B0604020202020204" pitchFamily="34" charset="0"/>
+            </a:endParaRPr>
+          </a:p>
+        </p:txBody>
+      </p:sp>
+      <p:sp>
+        <p:nvSpPr>
+          <p:cNvPr id="59" name="Textfeld 58"/>
+          <p:cNvSpPr txBox="1"/>
+          <p:nvPr/>
+        </p:nvSpPr>
+        <p:spPr>
+          <a:xfrm>
+            <a:off x="4934463" y="6705743"/>
+            <a:ext cx="288032" cy="400110"/>
+          </a:xfrm>
+          <a:prstGeom prst="rect">
+            <a:avLst/>
+          </a:prstGeom>
+          <a:noFill/>
+        </p:spPr>
+        <p:txBody>
+          <a:bodyPr wrap="square" rtlCol="0">
+            <a:spAutoFit/>
+          </a:bodyPr>
+          <a:lstStyle/>
+          <a:p>
+            <a:r>
+              <a:rPr lang="de-CH" sz="2000" b="1" dirty="0">
+                <a:latin typeface="Arial" panose="020B0604020202020204" pitchFamily="34" charset="0"/>
+                <a:cs typeface="Arial" panose="020B0604020202020204" pitchFamily="34" charset="0"/>
+              </a:rPr>
+              <a:t>C</a:t>
+            </a:r>
+            <a:endParaRPr lang="en-GB" sz="2000" b="1" dirty="0">
+              <a:latin typeface="Arial" panose="020B0604020202020204" pitchFamily="34" charset="0"/>
+              <a:cs typeface="Arial" panose="020B0604020202020204" pitchFamily="34" charset="0"/>
+            </a:endParaRPr>
+          </a:p>
+        </p:txBody>
+      </p:sp>
+      <p:sp>
+        <p:nvSpPr>
+          <p:cNvPr id="51" name="Textfeld 50"/>
+          <p:cNvSpPr txBox="1"/>
+          <p:nvPr/>
+        </p:nvSpPr>
+        <p:spPr>
+          <a:xfrm>
+            <a:off x="4839812" y="8690110"/>
+            <a:ext cx="1800200" cy="338554"/>
+          </a:xfrm>
+          <a:prstGeom prst="rect">
+            <a:avLst/>
+          </a:prstGeom>
+          <a:noFill/>
+        </p:spPr>
+        <p:txBody>
+          <a:bodyPr wrap="square" rtlCol="0">
+            <a:spAutoFit/>
+          </a:bodyPr>
+          <a:lstStyle/>
+          <a:p>
+            <a:r>
+              <a:rPr lang="de-CH" sz="1600" b="1" dirty="0" smtClean="0">
+                <a:latin typeface="Arial" panose="020B0604020202020204" pitchFamily="34" charset="0"/>
+                <a:cs typeface="Arial" panose="020B0604020202020204" pitchFamily="34" charset="0"/>
+              </a:rPr>
+              <a:t>N-terminus</a:t>
+            </a:r>
+            <a:endParaRPr lang="en-GB" b="1" dirty="0">
+              <a:latin typeface="Arial" panose="020B0604020202020204" pitchFamily="34" charset="0"/>
+              <a:cs typeface="Arial" panose="020B0604020202020204" pitchFamily="34" charset="0"/>
+            </a:endParaRPr>
+          </a:p>
+        </p:txBody>
+      </p:sp>
+    </p:spTree>
+    <p:extLst>
+      <p:ext uri="{BB962C8B-B14F-4D97-AF65-F5344CB8AC3E}">
+        <p14:creationId xmlns:p14="http://schemas.microsoft.com/office/powerpoint/2010/main" val="2179517157"/>
       </p:ext>
     </p:extLst>
   </p:cSld>

</xml_diff>